<commit_message>
Some additions to lecture 1 and the first iteration of lecture 2
</commit_message>
<xml_diff>
--- a/Lecture_1/images/pinhole_projection.pptx
+++ b/Lecture_1/images/pinhole_projection.pptx
@@ -7,7 +7,7 @@
   <p:sldIdLst>
     <p:sldId id="256" r:id="rId2"/>
   </p:sldIdLst>
-  <p:sldSz cx="7991475" cy="5403850"/>
+  <p:sldSz cx="7991475" cy="5761038"/>
   <p:notesSz cx="6858000" cy="9144000"/>
   <p:defaultTextStyle>
     <a:defPPr>
@@ -136,8 +136,8 @@
         </p:nvSpPr>
         <p:spPr>
           <a:xfrm>
-            <a:off x="599361" y="1678697"/>
-            <a:ext cx="6792754" cy="1158325"/>
+            <a:off x="599361" y="1789657"/>
+            <a:ext cx="6792754" cy="1234889"/>
           </a:xfrm>
         </p:spPr>
         <p:txBody>
@@ -164,8 +164,8 @@
         </p:nvSpPr>
         <p:spPr>
           <a:xfrm>
-            <a:off x="1198721" y="3062182"/>
-            <a:ext cx="5594033" cy="1380984"/>
+            <a:off x="1198722" y="3264589"/>
+            <a:ext cx="5594033" cy="1472265"/>
           </a:xfrm>
         </p:spPr>
         <p:txBody>
@@ -288,7 +288,7 @@
           <a:p>
             <a:fld id="{7F37A421-E2BE-A744-A1A0-937201EFD21E}" type="datetimeFigureOut">
               <a:rPr lang="en-US" smtClean="0"/>
-              <a:t>05/02/18</a:t>
+              <a:t>12/02/18</a:t>
             </a:fld>
             <a:endParaRPr lang="en-US"/>
           </a:p>
@@ -458,7 +458,7 @@
           <a:p>
             <a:fld id="{7F37A421-E2BE-A744-A1A0-937201EFD21E}" type="datetimeFigureOut">
               <a:rPr lang="en-US" smtClean="0"/>
-              <a:t>05/02/18</a:t>
+              <a:t>12/02/18</a:t>
             </a:fld>
             <a:endParaRPr lang="en-US"/>
           </a:p>
@@ -548,8 +548,8 @@
         </p:nvSpPr>
         <p:spPr>
           <a:xfrm>
-            <a:off x="5064042" y="170121"/>
-            <a:ext cx="1570547" cy="3633839"/>
+            <a:off x="5064043" y="181367"/>
+            <a:ext cx="1570547" cy="3874031"/>
           </a:xfrm>
         </p:spPr>
         <p:txBody>
@@ -576,8 +576,8 @@
         </p:nvSpPr>
         <p:spPr>
           <a:xfrm>
-            <a:off x="349627" y="170121"/>
-            <a:ext cx="4581224" cy="3633839"/>
+            <a:off x="349627" y="181367"/>
+            <a:ext cx="4581224" cy="3874031"/>
           </a:xfrm>
         </p:spPr>
         <p:txBody>
@@ -638,7 +638,7 @@
           <a:p>
             <a:fld id="{7F37A421-E2BE-A744-A1A0-937201EFD21E}" type="datetimeFigureOut">
               <a:rPr lang="en-US" smtClean="0"/>
-              <a:t>05/02/18</a:t>
+              <a:t>12/02/18</a:t>
             </a:fld>
             <a:endParaRPr lang="en-US"/>
           </a:p>
@@ -808,7 +808,7 @@
           <a:p>
             <a:fld id="{7F37A421-E2BE-A744-A1A0-937201EFD21E}" type="datetimeFigureOut">
               <a:rPr lang="en-US" smtClean="0"/>
-              <a:t>05/02/18</a:t>
+              <a:t>12/02/18</a:t>
             </a:fld>
             <a:endParaRPr lang="en-US"/>
           </a:p>
@@ -898,8 +898,8 @@
         </p:nvSpPr>
         <p:spPr>
           <a:xfrm>
-            <a:off x="631271" y="3472474"/>
-            <a:ext cx="6792754" cy="1073265"/>
+            <a:off x="631271" y="3702001"/>
+            <a:ext cx="6792754" cy="1144207"/>
           </a:xfrm>
         </p:spPr>
         <p:txBody>
@@ -930,8 +930,8 @@
         </p:nvSpPr>
         <p:spPr>
           <a:xfrm>
-            <a:off x="631271" y="2290382"/>
-            <a:ext cx="6792754" cy="1182092"/>
+            <a:off x="631271" y="2441773"/>
+            <a:ext cx="6792754" cy="1260227"/>
           </a:xfrm>
         </p:spPr>
         <p:txBody>
@@ -1054,7 +1054,7 @@
           <a:p>
             <a:fld id="{7F37A421-E2BE-A744-A1A0-937201EFD21E}" type="datetimeFigureOut">
               <a:rPr lang="en-US" smtClean="0"/>
-              <a:t>05/02/18</a:t>
+              <a:t>12/02/18</a:t>
             </a:fld>
             <a:endParaRPr lang="en-US"/>
           </a:p>
@@ -1167,8 +1167,8 @@
         </p:nvSpPr>
         <p:spPr>
           <a:xfrm>
-            <a:off x="349627" y="993208"/>
-            <a:ext cx="3075886" cy="2810753"/>
+            <a:off x="349627" y="1058859"/>
+            <a:ext cx="3075886" cy="2996540"/>
           </a:xfrm>
         </p:spPr>
         <p:txBody>
@@ -1252,8 +1252,8 @@
         </p:nvSpPr>
         <p:spPr>
           <a:xfrm>
-            <a:off x="3558705" y="993208"/>
-            <a:ext cx="3075885" cy="2810753"/>
+            <a:off x="3558706" y="1058859"/>
+            <a:ext cx="3075885" cy="2996540"/>
           </a:xfrm>
         </p:spPr>
         <p:txBody>
@@ -1342,7 +1342,7 @@
           <a:p>
             <a:fld id="{7F37A421-E2BE-A744-A1A0-937201EFD21E}" type="datetimeFigureOut">
               <a:rPr lang="en-US" smtClean="0"/>
-              <a:t>05/02/18</a:t>
+              <a:t>12/02/18</a:t>
             </a:fld>
             <a:endParaRPr lang="en-US"/>
           </a:p>
@@ -1432,8 +1432,8 @@
         </p:nvSpPr>
         <p:spPr>
           <a:xfrm>
-            <a:off x="399574" y="216404"/>
-            <a:ext cx="7192328" cy="900642"/>
+            <a:off x="399574" y="230708"/>
+            <a:ext cx="7192328" cy="960173"/>
           </a:xfrm>
         </p:spPr>
         <p:txBody>
@@ -1464,8 +1464,8 @@
         </p:nvSpPr>
         <p:spPr>
           <a:xfrm>
-            <a:off x="399574" y="1209612"/>
-            <a:ext cx="3530956" cy="504109"/>
+            <a:off x="399574" y="1289566"/>
+            <a:ext cx="3530956" cy="537430"/>
           </a:xfrm>
         </p:spPr>
         <p:txBody>
@@ -1529,8 +1529,8 @@
         </p:nvSpPr>
         <p:spPr>
           <a:xfrm>
-            <a:off x="399574" y="1713721"/>
-            <a:ext cx="3530956" cy="3113469"/>
+            <a:off x="399574" y="1826996"/>
+            <a:ext cx="3530956" cy="3319266"/>
           </a:xfrm>
         </p:spPr>
         <p:txBody>
@@ -1614,8 +1614,8 @@
         </p:nvSpPr>
         <p:spPr>
           <a:xfrm>
-            <a:off x="4059559" y="1209612"/>
-            <a:ext cx="3532343" cy="504109"/>
+            <a:off x="4059560" y="1289566"/>
+            <a:ext cx="3532343" cy="537430"/>
           </a:xfrm>
         </p:spPr>
         <p:txBody>
@@ -1679,8 +1679,8 @@
         </p:nvSpPr>
         <p:spPr>
           <a:xfrm>
-            <a:off x="4059559" y="1713721"/>
-            <a:ext cx="3532343" cy="3113469"/>
+            <a:off x="4059560" y="1826996"/>
+            <a:ext cx="3532343" cy="3319266"/>
           </a:xfrm>
         </p:spPr>
         <p:txBody>
@@ -1769,7 +1769,7 @@
           <a:p>
             <a:fld id="{7F37A421-E2BE-A744-A1A0-937201EFD21E}" type="datetimeFigureOut">
               <a:rPr lang="en-US" smtClean="0"/>
-              <a:t>05/02/18</a:t>
+              <a:t>12/02/18</a:t>
             </a:fld>
             <a:endParaRPr lang="en-US"/>
           </a:p>
@@ -1887,7 +1887,7 @@
           <a:p>
             <a:fld id="{7F37A421-E2BE-A744-A1A0-937201EFD21E}" type="datetimeFigureOut">
               <a:rPr lang="en-US" smtClean="0"/>
-              <a:t>05/02/18</a:t>
+              <a:t>12/02/18</a:t>
             </a:fld>
             <a:endParaRPr lang="en-US"/>
           </a:p>
@@ -1982,7 +1982,7 @@
           <a:p>
             <a:fld id="{7F37A421-E2BE-A744-A1A0-937201EFD21E}" type="datetimeFigureOut">
               <a:rPr lang="en-US" smtClean="0"/>
-              <a:t>05/02/18</a:t>
+              <a:t>12/02/18</a:t>
             </a:fld>
             <a:endParaRPr lang="en-US"/>
           </a:p>
@@ -2072,8 +2072,8 @@
         </p:nvSpPr>
         <p:spPr>
           <a:xfrm>
-            <a:off x="399574" y="215153"/>
-            <a:ext cx="2629140" cy="915652"/>
+            <a:off x="399574" y="229375"/>
+            <a:ext cx="2629140" cy="976175"/>
           </a:xfrm>
         </p:spPr>
         <p:txBody>
@@ -2104,8 +2104,8 @@
         </p:nvSpPr>
         <p:spPr>
           <a:xfrm>
-            <a:off x="3124444" y="215154"/>
-            <a:ext cx="4467457" cy="4612036"/>
+            <a:off x="3124445" y="229375"/>
+            <a:ext cx="4467457" cy="4916886"/>
           </a:xfrm>
         </p:spPr>
         <p:txBody>
@@ -2189,8 +2189,8 @@
         </p:nvSpPr>
         <p:spPr>
           <a:xfrm>
-            <a:off x="399574" y="1130806"/>
-            <a:ext cx="2629140" cy="3696384"/>
+            <a:off x="399574" y="1205551"/>
+            <a:ext cx="2629140" cy="3940711"/>
           </a:xfrm>
         </p:spPr>
         <p:txBody>
@@ -2259,7 +2259,7 @@
           <a:p>
             <a:fld id="{7F37A421-E2BE-A744-A1A0-937201EFD21E}" type="datetimeFigureOut">
               <a:rPr lang="en-US" smtClean="0"/>
-              <a:t>05/02/18</a:t>
+              <a:t>12/02/18</a:t>
             </a:fld>
             <a:endParaRPr lang="en-US"/>
           </a:p>
@@ -2349,8 +2349,8 @@
         </p:nvSpPr>
         <p:spPr>
           <a:xfrm>
-            <a:off x="1566385" y="3782695"/>
-            <a:ext cx="4794885" cy="446569"/>
+            <a:off x="1566386" y="4032727"/>
+            <a:ext cx="4794885" cy="476087"/>
           </a:xfrm>
         </p:spPr>
         <p:txBody>
@@ -2381,8 +2381,8 @@
         </p:nvSpPr>
         <p:spPr>
           <a:xfrm>
-            <a:off x="1566385" y="482844"/>
-            <a:ext cx="4794885" cy="3242310"/>
+            <a:off x="1566386" y="514759"/>
+            <a:ext cx="4794885" cy="3456623"/>
           </a:xfrm>
         </p:spPr>
         <p:txBody>
@@ -2442,8 +2442,8 @@
         </p:nvSpPr>
         <p:spPr>
           <a:xfrm>
-            <a:off x="1566385" y="4229264"/>
-            <a:ext cx="4794885" cy="634201"/>
+            <a:off x="1566386" y="4508814"/>
+            <a:ext cx="4794885" cy="676121"/>
           </a:xfrm>
         </p:spPr>
         <p:txBody>
@@ -2512,7 +2512,7 @@
           <a:p>
             <a:fld id="{7F37A421-E2BE-A744-A1A0-937201EFD21E}" type="datetimeFigureOut">
               <a:rPr lang="en-US" smtClean="0"/>
-              <a:t>05/02/18</a:t>
+              <a:t>12/02/18</a:t>
             </a:fld>
             <a:endParaRPr lang="en-US"/>
           </a:p>
@@ -2607,8 +2607,8 @@
         </p:nvSpPr>
         <p:spPr>
           <a:xfrm>
-            <a:off x="399574" y="216404"/>
-            <a:ext cx="7192328" cy="900642"/>
+            <a:off x="399574" y="230708"/>
+            <a:ext cx="7192328" cy="960173"/>
           </a:xfrm>
           <a:prstGeom prst="rect">
             <a:avLst/>
@@ -2640,8 +2640,8 @@
         </p:nvSpPr>
         <p:spPr>
           <a:xfrm>
-            <a:off x="399574" y="1260899"/>
-            <a:ext cx="7192328" cy="3566291"/>
+            <a:off x="399574" y="1344243"/>
+            <a:ext cx="7192328" cy="3802019"/>
           </a:xfrm>
           <a:prstGeom prst="rect">
             <a:avLst/>
@@ -2702,8 +2702,8 @@
         </p:nvSpPr>
         <p:spPr>
           <a:xfrm>
-            <a:off x="399574" y="5008569"/>
-            <a:ext cx="1864678" cy="287705"/>
+            <a:off x="399574" y="5339630"/>
+            <a:ext cx="1864678" cy="306722"/>
           </a:xfrm>
           <a:prstGeom prst="rect">
             <a:avLst/>
@@ -2725,7 +2725,7 @@
           <a:p>
             <a:fld id="{7F37A421-E2BE-A744-A1A0-937201EFD21E}" type="datetimeFigureOut">
               <a:rPr lang="en-US" smtClean="0"/>
-              <a:t>05/02/18</a:t>
+              <a:t>12/02/18</a:t>
             </a:fld>
             <a:endParaRPr lang="en-US"/>
           </a:p>
@@ -2743,8 +2743,8 @@
         </p:nvSpPr>
         <p:spPr>
           <a:xfrm>
-            <a:off x="2730421" y="5008569"/>
-            <a:ext cx="2530634" cy="287705"/>
+            <a:off x="2730421" y="5339630"/>
+            <a:ext cx="2530634" cy="306722"/>
           </a:xfrm>
           <a:prstGeom prst="rect">
             <a:avLst/>
@@ -2780,8 +2780,8 @@
         </p:nvSpPr>
         <p:spPr>
           <a:xfrm>
-            <a:off x="5727224" y="5008569"/>
-            <a:ext cx="1864678" cy="287705"/>
+            <a:off x="5727224" y="5339630"/>
+            <a:ext cx="1864678" cy="306722"/>
           </a:xfrm>
           <a:prstGeom prst="rect">
             <a:avLst/>
@@ -3100,828 +3100,1211 @@
           <a:chExt cx="0" cy="0"/>
         </a:xfrm>
       </p:grpSpPr>
-      <p:pic>
-        <p:nvPicPr>
-          <p:cNvPr id="4" name="Picture 3" descr="latex-image-1.pdf"/>
-          <p:cNvPicPr>
-            <a:picLocks noChangeAspect="1"/>
-          </p:cNvPicPr>
-          <p:nvPr/>
-        </p:nvPicPr>
-        <p:blipFill>
-          <a:blip r:embed="rId2">
-            <a:extLst>
-              <a:ext uri="{28A0092B-C50C-407E-A947-70E740481C1C}">
-                <a14:useLocalDpi xmlns:a14="http://schemas.microsoft.com/office/drawing/2010/main" val="0"/>
-              </a:ext>
-            </a:extLst>
-          </a:blip>
-          <a:stretch>
-            <a:fillRect/>
-          </a:stretch>
-        </p:blipFill>
-        <p:spPr>
-          <a:xfrm>
-            <a:off x="6506459" y="4686762"/>
-            <a:ext cx="1006054" cy="396000"/>
-          </a:xfrm>
-          <a:prstGeom prst="rect">
-            <a:avLst/>
-          </a:prstGeom>
-        </p:spPr>
-      </p:pic>
       <p:grpSp>
         <p:nvGrpSpPr>
-          <p:cNvPr id="11" name="Group 10"/>
+          <p:cNvPr id="49" name="Group 48"/>
           <p:cNvGrpSpPr/>
           <p:nvPr/>
         </p:nvGrpSpPr>
         <p:grpSpPr>
           <a:xfrm>
-            <a:off x="230760" y="172212"/>
-            <a:ext cx="1275288" cy="3394833"/>
-            <a:chOff x="1115645" y="941810"/>
-            <a:chExt cx="1319537" cy="3640201"/>
+            <a:off x="179987" y="-42807"/>
+            <a:ext cx="7706117" cy="5729962"/>
+            <a:chOff x="137177" y="0"/>
+            <a:chExt cx="7706117" cy="5729962"/>
           </a:xfrm>
         </p:grpSpPr>
-        <p:cxnSp>
-          <p:nvCxnSpPr>
-            <p:cNvPr id="5" name="Straight Connector 4"/>
-            <p:cNvCxnSpPr/>
+        <p:grpSp>
+          <p:nvGrpSpPr>
+            <p:cNvPr id="50" name="Group 49"/>
+            <p:cNvGrpSpPr/>
             <p:nvPr/>
-          </p:nvCxnSpPr>
-          <p:spPr>
+          </p:nvGrpSpPr>
+          <p:grpSpPr>
             <a:xfrm>
-              <a:off x="1115645" y="1819075"/>
-              <a:ext cx="0" cy="2762936"/>
+              <a:off x="137177" y="0"/>
+              <a:ext cx="7706117" cy="4919187"/>
+              <a:chOff x="230760" y="0"/>
+              <a:chExt cx="7706117" cy="4919187"/>
             </a:xfrm>
-            <a:prstGeom prst="line">
-              <a:avLst/>
-            </a:prstGeom>
-            <a:ln>
+          </p:grpSpPr>
+          <p:grpSp>
+            <p:nvGrpSpPr>
+              <p:cNvPr id="52" name="Group 51"/>
+              <p:cNvGrpSpPr/>
+              <p:nvPr/>
+            </p:nvGrpSpPr>
+            <p:grpSpPr>
+              <a:xfrm>
+                <a:off x="230760" y="1524354"/>
+                <a:ext cx="1275288" cy="3394833"/>
+                <a:chOff x="1115645" y="941810"/>
+                <a:chExt cx="1319537" cy="3640201"/>
+              </a:xfrm>
+            </p:grpSpPr>
+            <p:cxnSp>
+              <p:nvCxnSpPr>
+                <p:cNvPr id="82" name="Straight Connector 81"/>
+                <p:cNvCxnSpPr/>
+                <p:nvPr/>
+              </p:nvCxnSpPr>
+              <p:spPr>
+                <a:xfrm>
+                  <a:off x="1115645" y="1819075"/>
+                  <a:ext cx="0" cy="2762936"/>
+                </a:xfrm>
+                <a:prstGeom prst="line">
+                  <a:avLst/>
+                </a:prstGeom>
+                <a:ln>
+                  <a:solidFill>
+                    <a:schemeClr val="tx1"/>
+                  </a:solidFill>
+                </a:ln>
+                <a:effectLst/>
+              </p:spPr>
+              <p:style>
+                <a:lnRef idx="2">
+                  <a:schemeClr val="accent1"/>
+                </a:lnRef>
+                <a:fillRef idx="0">
+                  <a:schemeClr val="accent1"/>
+                </a:fillRef>
+                <a:effectRef idx="1">
+                  <a:schemeClr val="accent1"/>
+                </a:effectRef>
+                <a:fontRef idx="minor">
+                  <a:schemeClr val="tx1"/>
+                </a:fontRef>
+              </p:style>
+            </p:cxnSp>
+            <p:cxnSp>
+              <p:nvCxnSpPr>
+                <p:cNvPr id="83" name="Straight Connector 82"/>
+                <p:cNvCxnSpPr/>
+                <p:nvPr/>
+              </p:nvCxnSpPr>
+              <p:spPr>
+                <a:xfrm>
+                  <a:off x="2435182" y="941810"/>
+                  <a:ext cx="0" cy="2762936"/>
+                </a:xfrm>
+                <a:prstGeom prst="line">
+                  <a:avLst/>
+                </a:prstGeom>
+                <a:ln>
+                  <a:solidFill>
+                    <a:schemeClr val="tx1"/>
+                  </a:solidFill>
+                </a:ln>
+                <a:effectLst/>
+              </p:spPr>
+              <p:style>
+                <a:lnRef idx="2">
+                  <a:schemeClr val="accent1"/>
+                </a:lnRef>
+                <a:fillRef idx="0">
+                  <a:schemeClr val="accent1"/>
+                </a:fillRef>
+                <a:effectRef idx="1">
+                  <a:schemeClr val="accent1"/>
+                </a:effectRef>
+                <a:fontRef idx="minor">
+                  <a:schemeClr val="tx1"/>
+                </a:fontRef>
+              </p:style>
+            </p:cxnSp>
+            <p:cxnSp>
+              <p:nvCxnSpPr>
+                <p:cNvPr id="84" name="Straight Connector 83"/>
+                <p:cNvCxnSpPr/>
+                <p:nvPr/>
+              </p:nvCxnSpPr>
+              <p:spPr>
+                <a:xfrm flipV="1">
+                  <a:off x="1115645" y="941810"/>
+                  <a:ext cx="1319537" cy="877265"/>
+                </a:xfrm>
+                <a:prstGeom prst="line">
+                  <a:avLst/>
+                </a:prstGeom>
+                <a:ln>
+                  <a:solidFill>
+                    <a:schemeClr val="tx1"/>
+                  </a:solidFill>
+                </a:ln>
+                <a:effectLst/>
+              </p:spPr>
+              <p:style>
+                <a:lnRef idx="2">
+                  <a:schemeClr val="accent1"/>
+                </a:lnRef>
+                <a:fillRef idx="0">
+                  <a:schemeClr val="accent1"/>
+                </a:fillRef>
+                <a:effectRef idx="1">
+                  <a:schemeClr val="accent1"/>
+                </a:effectRef>
+                <a:fontRef idx="minor">
+                  <a:schemeClr val="tx1"/>
+                </a:fontRef>
+              </p:style>
+            </p:cxnSp>
+            <p:cxnSp>
+              <p:nvCxnSpPr>
+                <p:cNvPr id="85" name="Straight Connector 84"/>
+                <p:cNvCxnSpPr/>
+                <p:nvPr/>
+              </p:nvCxnSpPr>
+              <p:spPr>
+                <a:xfrm flipV="1">
+                  <a:off x="1115645" y="3704746"/>
+                  <a:ext cx="1319537" cy="877265"/>
+                </a:xfrm>
+                <a:prstGeom prst="line">
+                  <a:avLst/>
+                </a:prstGeom>
+                <a:ln>
+                  <a:solidFill>
+                    <a:schemeClr val="tx1"/>
+                  </a:solidFill>
+                </a:ln>
+                <a:effectLst/>
+              </p:spPr>
+              <p:style>
+                <a:lnRef idx="2">
+                  <a:schemeClr val="accent1"/>
+                </a:lnRef>
+                <a:fillRef idx="0">
+                  <a:schemeClr val="accent1"/>
+                </a:fillRef>
+                <a:effectRef idx="1">
+                  <a:schemeClr val="accent1"/>
+                </a:effectRef>
+                <a:fontRef idx="minor">
+                  <a:schemeClr val="tx1"/>
+                </a:fontRef>
+              </p:style>
+            </p:cxnSp>
+          </p:grpSp>
+          <p:grpSp>
+            <p:nvGrpSpPr>
+              <p:cNvPr id="53" name="Group 52"/>
+              <p:cNvGrpSpPr/>
+              <p:nvPr/>
+            </p:nvGrpSpPr>
+            <p:grpSpPr>
+              <a:xfrm>
+                <a:off x="3297575" y="1524354"/>
+                <a:ext cx="1275288" cy="3394833"/>
+                <a:chOff x="1115645" y="941810"/>
+                <a:chExt cx="1319537" cy="3640201"/>
+              </a:xfrm>
+            </p:grpSpPr>
+            <p:cxnSp>
+              <p:nvCxnSpPr>
+                <p:cNvPr id="78" name="Straight Connector 77"/>
+                <p:cNvCxnSpPr/>
+                <p:nvPr/>
+              </p:nvCxnSpPr>
+              <p:spPr>
+                <a:xfrm>
+                  <a:off x="1115645" y="1819075"/>
+                  <a:ext cx="0" cy="2762936"/>
+                </a:xfrm>
+                <a:prstGeom prst="line">
+                  <a:avLst/>
+                </a:prstGeom>
+                <a:ln>
+                  <a:solidFill>
+                    <a:schemeClr val="tx1"/>
+                  </a:solidFill>
+                </a:ln>
+                <a:effectLst/>
+              </p:spPr>
+              <p:style>
+                <a:lnRef idx="2">
+                  <a:schemeClr val="accent1"/>
+                </a:lnRef>
+                <a:fillRef idx="0">
+                  <a:schemeClr val="accent1"/>
+                </a:fillRef>
+                <a:effectRef idx="1">
+                  <a:schemeClr val="accent1"/>
+                </a:effectRef>
+                <a:fontRef idx="minor">
+                  <a:schemeClr val="tx1"/>
+                </a:fontRef>
+              </p:style>
+            </p:cxnSp>
+            <p:cxnSp>
+              <p:nvCxnSpPr>
+                <p:cNvPr id="79" name="Straight Connector 78"/>
+                <p:cNvCxnSpPr/>
+                <p:nvPr/>
+              </p:nvCxnSpPr>
+              <p:spPr>
+                <a:xfrm>
+                  <a:off x="2435182" y="941810"/>
+                  <a:ext cx="0" cy="2762936"/>
+                </a:xfrm>
+                <a:prstGeom prst="line">
+                  <a:avLst/>
+                </a:prstGeom>
+                <a:ln>
+                  <a:solidFill>
+                    <a:schemeClr val="tx1"/>
+                  </a:solidFill>
+                </a:ln>
+                <a:effectLst/>
+              </p:spPr>
+              <p:style>
+                <a:lnRef idx="2">
+                  <a:schemeClr val="accent1"/>
+                </a:lnRef>
+                <a:fillRef idx="0">
+                  <a:schemeClr val="accent1"/>
+                </a:fillRef>
+                <a:effectRef idx="1">
+                  <a:schemeClr val="accent1"/>
+                </a:effectRef>
+                <a:fontRef idx="minor">
+                  <a:schemeClr val="tx1"/>
+                </a:fontRef>
+              </p:style>
+            </p:cxnSp>
+            <p:cxnSp>
+              <p:nvCxnSpPr>
+                <p:cNvPr id="80" name="Straight Connector 79"/>
+                <p:cNvCxnSpPr/>
+                <p:nvPr/>
+              </p:nvCxnSpPr>
+              <p:spPr>
+                <a:xfrm flipV="1">
+                  <a:off x="1115645" y="941810"/>
+                  <a:ext cx="1319537" cy="877265"/>
+                </a:xfrm>
+                <a:prstGeom prst="line">
+                  <a:avLst/>
+                </a:prstGeom>
+                <a:ln>
+                  <a:solidFill>
+                    <a:schemeClr val="tx1"/>
+                  </a:solidFill>
+                </a:ln>
+                <a:effectLst/>
+              </p:spPr>
+              <p:style>
+                <a:lnRef idx="2">
+                  <a:schemeClr val="accent1"/>
+                </a:lnRef>
+                <a:fillRef idx="0">
+                  <a:schemeClr val="accent1"/>
+                </a:fillRef>
+                <a:effectRef idx="1">
+                  <a:schemeClr val="accent1"/>
+                </a:effectRef>
+                <a:fontRef idx="minor">
+                  <a:schemeClr val="tx1"/>
+                </a:fontRef>
+              </p:style>
+            </p:cxnSp>
+            <p:cxnSp>
+              <p:nvCxnSpPr>
+                <p:cNvPr id="81" name="Straight Connector 80"/>
+                <p:cNvCxnSpPr/>
+                <p:nvPr/>
+              </p:nvCxnSpPr>
+              <p:spPr>
+                <a:xfrm flipV="1">
+                  <a:off x="1115645" y="3704746"/>
+                  <a:ext cx="1319537" cy="877265"/>
+                </a:xfrm>
+                <a:prstGeom prst="line">
+                  <a:avLst/>
+                </a:prstGeom>
+                <a:ln>
+                  <a:solidFill>
+                    <a:schemeClr val="tx1"/>
+                  </a:solidFill>
+                </a:ln>
+                <a:effectLst/>
+              </p:spPr>
+              <p:style>
+                <a:lnRef idx="2">
+                  <a:schemeClr val="accent1"/>
+                </a:lnRef>
+                <a:fillRef idx="0">
+                  <a:schemeClr val="accent1"/>
+                </a:fillRef>
+                <a:effectRef idx="1">
+                  <a:schemeClr val="accent1"/>
+                </a:effectRef>
+                <a:fontRef idx="minor">
+                  <a:schemeClr val="tx1"/>
+                </a:fontRef>
+              </p:style>
+            </p:cxnSp>
+          </p:grpSp>
+          <p:grpSp>
+            <p:nvGrpSpPr>
+              <p:cNvPr id="54" name="Group 53"/>
+              <p:cNvGrpSpPr/>
+              <p:nvPr/>
+            </p:nvGrpSpPr>
+            <p:grpSpPr>
+              <a:xfrm>
+                <a:off x="6364391" y="1524354"/>
+                <a:ext cx="1275288" cy="3394833"/>
+                <a:chOff x="1115645" y="941810"/>
+                <a:chExt cx="1319537" cy="3640201"/>
+              </a:xfrm>
+            </p:grpSpPr>
+            <p:cxnSp>
+              <p:nvCxnSpPr>
+                <p:cNvPr id="74" name="Straight Connector 73"/>
+                <p:cNvCxnSpPr/>
+                <p:nvPr/>
+              </p:nvCxnSpPr>
+              <p:spPr>
+                <a:xfrm>
+                  <a:off x="1115645" y="1819075"/>
+                  <a:ext cx="0" cy="2762936"/>
+                </a:xfrm>
+                <a:prstGeom prst="line">
+                  <a:avLst/>
+                </a:prstGeom>
+                <a:ln>
+                  <a:solidFill>
+                    <a:schemeClr val="tx1"/>
+                  </a:solidFill>
+                </a:ln>
+                <a:effectLst/>
+              </p:spPr>
+              <p:style>
+                <a:lnRef idx="2">
+                  <a:schemeClr val="accent1"/>
+                </a:lnRef>
+                <a:fillRef idx="0">
+                  <a:schemeClr val="accent1"/>
+                </a:fillRef>
+                <a:effectRef idx="1">
+                  <a:schemeClr val="accent1"/>
+                </a:effectRef>
+                <a:fontRef idx="minor">
+                  <a:schemeClr val="tx1"/>
+                </a:fontRef>
+              </p:style>
+            </p:cxnSp>
+            <p:cxnSp>
+              <p:nvCxnSpPr>
+                <p:cNvPr id="75" name="Straight Connector 74"/>
+                <p:cNvCxnSpPr/>
+                <p:nvPr/>
+              </p:nvCxnSpPr>
+              <p:spPr>
+                <a:xfrm>
+                  <a:off x="2435182" y="941810"/>
+                  <a:ext cx="0" cy="2762936"/>
+                </a:xfrm>
+                <a:prstGeom prst="line">
+                  <a:avLst/>
+                </a:prstGeom>
+                <a:ln>
+                  <a:solidFill>
+                    <a:schemeClr val="tx1"/>
+                  </a:solidFill>
+                </a:ln>
+                <a:effectLst/>
+              </p:spPr>
+              <p:style>
+                <a:lnRef idx="2">
+                  <a:schemeClr val="accent1"/>
+                </a:lnRef>
+                <a:fillRef idx="0">
+                  <a:schemeClr val="accent1"/>
+                </a:fillRef>
+                <a:effectRef idx="1">
+                  <a:schemeClr val="accent1"/>
+                </a:effectRef>
+                <a:fontRef idx="minor">
+                  <a:schemeClr val="tx1"/>
+                </a:fontRef>
+              </p:style>
+            </p:cxnSp>
+            <p:cxnSp>
+              <p:nvCxnSpPr>
+                <p:cNvPr id="76" name="Straight Connector 75"/>
+                <p:cNvCxnSpPr/>
+                <p:nvPr/>
+              </p:nvCxnSpPr>
+              <p:spPr>
+                <a:xfrm flipV="1">
+                  <a:off x="1115645" y="941810"/>
+                  <a:ext cx="1319537" cy="877265"/>
+                </a:xfrm>
+                <a:prstGeom prst="line">
+                  <a:avLst/>
+                </a:prstGeom>
+                <a:ln>
+                  <a:solidFill>
+                    <a:schemeClr val="tx1"/>
+                  </a:solidFill>
+                </a:ln>
+                <a:effectLst/>
+              </p:spPr>
+              <p:style>
+                <a:lnRef idx="2">
+                  <a:schemeClr val="accent1"/>
+                </a:lnRef>
+                <a:fillRef idx="0">
+                  <a:schemeClr val="accent1"/>
+                </a:fillRef>
+                <a:effectRef idx="1">
+                  <a:schemeClr val="accent1"/>
+                </a:effectRef>
+                <a:fontRef idx="minor">
+                  <a:schemeClr val="tx1"/>
+                </a:fontRef>
+              </p:style>
+            </p:cxnSp>
+            <p:cxnSp>
+              <p:nvCxnSpPr>
+                <p:cNvPr id="77" name="Straight Connector 76"/>
+                <p:cNvCxnSpPr/>
+                <p:nvPr/>
+              </p:nvCxnSpPr>
+              <p:spPr>
+                <a:xfrm flipV="1">
+                  <a:off x="1115645" y="3704746"/>
+                  <a:ext cx="1319537" cy="877265"/>
+                </a:xfrm>
+                <a:prstGeom prst="line">
+                  <a:avLst/>
+                </a:prstGeom>
+                <a:ln>
+                  <a:solidFill>
+                    <a:schemeClr val="tx1"/>
+                  </a:solidFill>
+                </a:ln>
+                <a:effectLst/>
+              </p:spPr>
+              <p:style>
+                <a:lnRef idx="2">
+                  <a:schemeClr val="accent1"/>
+                </a:lnRef>
+                <a:fillRef idx="0">
+                  <a:schemeClr val="accent1"/>
+                </a:fillRef>
+                <a:effectRef idx="1">
+                  <a:schemeClr val="accent1"/>
+                </a:effectRef>
+                <a:fontRef idx="minor">
+                  <a:schemeClr val="tx1"/>
+                </a:fontRef>
+              </p:style>
+            </p:cxnSp>
+          </p:grpSp>
+          <p:sp>
+            <p:nvSpPr>
+              <p:cNvPr id="55" name="Oval 54"/>
+              <p:cNvSpPr>
+                <a:spLocks noChangeAspect="1"/>
+              </p:cNvSpPr>
+              <p:nvPr/>
+            </p:nvSpPr>
+            <p:spPr>
+              <a:xfrm>
+                <a:off x="3825387" y="3120092"/>
+                <a:ext cx="189728" cy="359999"/>
+              </a:xfrm>
+              <a:prstGeom prst="ellipse">
+                <a:avLst/>
+              </a:prstGeom>
               <a:solidFill>
                 <a:schemeClr val="tx1"/>
               </a:solidFill>
-            </a:ln>
-            <a:effectLst/>
-          </p:spPr>
-          <p:style>
-            <a:lnRef idx="2">
-              <a:schemeClr val="accent1"/>
-            </a:lnRef>
-            <a:fillRef idx="0">
-              <a:schemeClr val="accent1"/>
-            </a:fillRef>
-            <a:effectRef idx="1">
-              <a:schemeClr val="accent1"/>
-            </a:effectRef>
-            <a:fontRef idx="minor">
-              <a:schemeClr val="tx1"/>
-            </a:fontRef>
-          </p:style>
-        </p:cxnSp>
-        <p:cxnSp>
-          <p:nvCxnSpPr>
-            <p:cNvPr id="6" name="Straight Connector 5"/>
-            <p:cNvCxnSpPr/>
+              <a:ln>
+                <a:solidFill>
+                  <a:srgbClr val="000000"/>
+                </a:solidFill>
+              </a:ln>
+              <a:effectLst/>
+            </p:spPr>
+            <p:style>
+              <a:lnRef idx="1">
+                <a:schemeClr val="accent1"/>
+              </a:lnRef>
+              <a:fillRef idx="3">
+                <a:schemeClr val="accent1"/>
+              </a:fillRef>
+              <a:effectRef idx="2">
+                <a:schemeClr val="accent1"/>
+              </a:effectRef>
+              <a:fontRef idx="minor">
+                <a:schemeClr val="lt1"/>
+              </a:fontRef>
+            </p:style>
+            <p:txBody>
+              <a:bodyPr rtlCol="0" anchor="ctr"/>
+              <a:lstStyle/>
+              <a:p>
+                <a:pPr algn="ctr"/>
+                <a:endParaRPr lang="en-US"/>
+              </a:p>
+            </p:txBody>
+          </p:sp>
+          <p:cxnSp>
+            <p:nvCxnSpPr>
+              <p:cNvPr id="56" name="Straight Connector 55"/>
+              <p:cNvCxnSpPr>
+                <a:endCxn id="58" idx="0"/>
+              </p:cNvCxnSpPr>
+              <p:nvPr/>
+            </p:nvCxnSpPr>
+            <p:spPr>
+              <a:xfrm flipV="1">
+                <a:off x="901583" y="2858903"/>
+                <a:ext cx="6137640" cy="492314"/>
+              </a:xfrm>
+              <a:prstGeom prst="line">
+                <a:avLst/>
+              </a:prstGeom>
+              <a:ln>
+                <a:solidFill>
+                  <a:srgbClr val="000000"/>
+                </a:solidFill>
+                <a:prstDash val="dash"/>
+                <a:headEnd type="none"/>
+                <a:tailEnd type="arrow"/>
+              </a:ln>
+              <a:effectLst/>
+            </p:spPr>
+            <p:style>
+              <a:lnRef idx="2">
+                <a:schemeClr val="accent1"/>
+              </a:lnRef>
+              <a:fillRef idx="0">
+                <a:schemeClr val="accent1"/>
+              </a:fillRef>
+              <a:effectRef idx="1">
+                <a:schemeClr val="accent1"/>
+              </a:effectRef>
+              <a:fontRef idx="minor">
+                <a:schemeClr val="tx1"/>
+              </a:fontRef>
+            </p:style>
+          </p:cxnSp>
+          <p:cxnSp>
+            <p:nvCxnSpPr>
+              <p:cNvPr id="57" name="Straight Connector 56"/>
+              <p:cNvCxnSpPr>
+                <a:endCxn id="58" idx="4"/>
+              </p:cNvCxnSpPr>
+              <p:nvPr/>
+            </p:nvCxnSpPr>
+            <p:spPr>
+              <a:xfrm>
+                <a:off x="901583" y="3351216"/>
+                <a:ext cx="6137640" cy="227686"/>
+              </a:xfrm>
+              <a:prstGeom prst="line">
+                <a:avLst/>
+              </a:prstGeom>
+              <a:ln>
+                <a:solidFill>
+                  <a:srgbClr val="000000"/>
+                </a:solidFill>
+                <a:prstDash val="dash"/>
+                <a:headEnd type="none"/>
+                <a:tailEnd type="arrow"/>
+              </a:ln>
+              <a:effectLst/>
+            </p:spPr>
+            <p:style>
+              <a:lnRef idx="2">
+                <a:schemeClr val="accent1"/>
+              </a:lnRef>
+              <a:fillRef idx="0">
+                <a:schemeClr val="accent1"/>
+              </a:fillRef>
+              <a:effectRef idx="1">
+                <a:schemeClr val="accent1"/>
+              </a:effectRef>
+              <a:fontRef idx="minor">
+                <a:schemeClr val="tx1"/>
+              </a:fontRef>
+            </p:style>
+          </p:cxnSp>
+          <p:sp>
+            <p:nvSpPr>
+              <p:cNvPr id="58" name="Oval 57"/>
+              <p:cNvSpPr>
+                <a:spLocks noChangeAspect="1"/>
+              </p:cNvSpPr>
+              <p:nvPr/>
+            </p:nvSpPr>
+            <p:spPr>
+              <a:xfrm>
+                <a:off x="6849493" y="2858903"/>
+                <a:ext cx="379457" cy="720000"/>
+              </a:xfrm>
+              <a:prstGeom prst="ellipse">
+                <a:avLst/>
+              </a:prstGeom>
+              <a:solidFill>
+                <a:srgbClr val="FFFFFF"/>
+              </a:solidFill>
+              <a:ln w="28575" cmpd="sng">
+                <a:solidFill>
+                  <a:srgbClr val="000000"/>
+                </a:solidFill>
+                <a:prstDash val="dash"/>
+              </a:ln>
+              <a:effectLst/>
+            </p:spPr>
+            <p:style>
+              <a:lnRef idx="1">
+                <a:schemeClr val="accent1"/>
+              </a:lnRef>
+              <a:fillRef idx="3">
+                <a:schemeClr val="accent1"/>
+              </a:fillRef>
+              <a:effectRef idx="2">
+                <a:schemeClr val="accent1"/>
+              </a:effectRef>
+              <a:fontRef idx="minor">
+                <a:schemeClr val="lt1"/>
+              </a:fontRef>
+            </p:style>
+            <p:txBody>
+              <a:bodyPr rtlCol="0" anchor="ctr"/>
+              <a:lstStyle/>
+              <a:p>
+                <a:pPr algn="ctr"/>
+                <a:endParaRPr lang="en-US"/>
+              </a:p>
+            </p:txBody>
+          </p:sp>
+          <p:sp>
+            <p:nvSpPr>
+              <p:cNvPr id="59" name="TextBox 58"/>
+              <p:cNvSpPr txBox="1"/>
+              <p:nvPr/>
+            </p:nvSpPr>
+            <p:spPr>
+              <a:xfrm>
+                <a:off x="3121373" y="396000"/>
+                <a:ext cx="1450807" cy="923330"/>
+              </a:xfrm>
+              <a:prstGeom prst="rect">
+                <a:avLst/>
+              </a:prstGeom>
+              <a:noFill/>
+            </p:spPr>
+            <p:txBody>
+              <a:bodyPr wrap="none" rtlCol="0" anchor="b">
+                <a:spAutoFit/>
+              </a:bodyPr>
+              <a:lstStyle/>
+              <a:p>
+                <a:pPr algn="ctr"/>
+                <a:r>
+                  <a:rPr lang="en-US" sz="2700" dirty="0"/>
+                  <a:t>Finite </a:t>
+                </a:r>
+              </a:p>
+              <a:p>
+                <a:pPr algn="ctr"/>
+                <a:r>
+                  <a:rPr lang="en-US" sz="2700" dirty="0"/>
+                  <a:t>Aperture</a:t>
+                </a:r>
+              </a:p>
+            </p:txBody>
+          </p:sp>
+          <p:grpSp>
+            <p:nvGrpSpPr>
+              <p:cNvPr id="60" name="Group 59"/>
+              <p:cNvGrpSpPr/>
+              <p:nvPr/>
+            </p:nvGrpSpPr>
+            <p:grpSpPr>
+              <a:xfrm>
+                <a:off x="299883" y="415499"/>
+                <a:ext cx="1147670" cy="903831"/>
+                <a:chOff x="446942" y="415499"/>
+                <a:chExt cx="1147670" cy="903831"/>
+              </a:xfrm>
+            </p:grpSpPr>
+            <p:sp>
+              <p:nvSpPr>
+                <p:cNvPr id="72" name="TextBox 71"/>
+                <p:cNvSpPr txBox="1"/>
+                <p:nvPr/>
+              </p:nvSpPr>
+              <p:spPr>
+                <a:xfrm>
+                  <a:off x="446942" y="415499"/>
+                  <a:ext cx="1147670" cy="507831"/>
+                </a:xfrm>
+                <a:prstGeom prst="rect">
+                  <a:avLst/>
+                </a:prstGeom>
+                <a:noFill/>
+              </p:spPr>
+              <p:txBody>
+                <a:bodyPr wrap="none" rtlCol="0">
+                  <a:spAutoFit/>
+                </a:bodyPr>
+                <a:lstStyle/>
+                <a:p>
+                  <a:pPr algn="ctr"/>
+                  <a:r>
+                    <a:rPr lang="en-US" sz="2700" dirty="0" smtClean="0"/>
+                    <a:t>Source</a:t>
+                  </a:r>
+                  <a:endParaRPr lang="en-US" sz="2700" dirty="0"/>
+                </a:p>
+              </p:txBody>
+            </p:sp>
+            <p:pic>
+              <p:nvPicPr>
+                <p:cNvPr id="73" name="Picture 72" descr="latex-image-1.pdf"/>
+                <p:cNvPicPr>
+                  <a:picLocks noChangeAspect="1"/>
+                </p:cNvPicPr>
+                <p:nvPr/>
+              </p:nvPicPr>
+              <p:blipFill>
+                <a:blip r:embed="rId2">
+                  <a:extLst>
+                    <a:ext uri="{28A0092B-C50C-407E-A947-70E740481C1C}">
+                      <a14:useLocalDpi xmlns:a14="http://schemas.microsoft.com/office/drawing/2010/main" val="0"/>
+                    </a:ext>
+                  </a:extLst>
+                </a:blip>
+                <a:stretch>
+                  <a:fillRect/>
+                </a:stretch>
+              </p:blipFill>
+              <p:spPr>
+                <a:xfrm>
+                  <a:off x="453534" y="923330"/>
+                  <a:ext cx="1134486" cy="396000"/>
+                </a:xfrm>
+                <a:prstGeom prst="rect">
+                  <a:avLst/>
+                </a:prstGeom>
+              </p:spPr>
+            </p:pic>
+          </p:grpSp>
+          <p:grpSp>
+            <p:nvGrpSpPr>
+              <p:cNvPr id="61" name="Group 60"/>
+              <p:cNvGrpSpPr/>
+              <p:nvPr/>
+            </p:nvGrpSpPr>
+            <p:grpSpPr>
+              <a:xfrm>
+                <a:off x="6398325" y="0"/>
+                <a:ext cx="1538552" cy="1319330"/>
+                <a:chOff x="6398325" y="0"/>
+                <a:chExt cx="1538552" cy="1319330"/>
+              </a:xfrm>
+            </p:grpSpPr>
+            <p:sp>
+              <p:nvSpPr>
+                <p:cNvPr id="70" name="TextBox 69"/>
+                <p:cNvSpPr txBox="1"/>
+                <p:nvPr/>
+              </p:nvSpPr>
+              <p:spPr>
+                <a:xfrm>
+                  <a:off x="6398325" y="0"/>
+                  <a:ext cx="1538552" cy="923330"/>
+                </a:xfrm>
+                <a:prstGeom prst="rect">
+                  <a:avLst/>
+                </a:prstGeom>
+                <a:noFill/>
+              </p:spPr>
+              <p:txBody>
+                <a:bodyPr wrap="none" rtlCol="0" anchor="b">
+                  <a:spAutoFit/>
+                </a:bodyPr>
+                <a:lstStyle/>
+                <a:p>
+                  <a:pPr algn="ctr"/>
+                  <a:r>
+                    <a:rPr lang="en-US" sz="2700" dirty="0"/>
+                    <a:t>Projected</a:t>
+                  </a:r>
+                </a:p>
+                <a:p>
+                  <a:pPr algn="ctr"/>
+                  <a:r>
+                    <a:rPr lang="en-US" sz="2700" dirty="0"/>
+                    <a:t>Image</a:t>
+                  </a:r>
+                </a:p>
+              </p:txBody>
+            </p:sp>
+            <p:pic>
+              <p:nvPicPr>
+                <p:cNvPr id="71" name="Picture 70" descr="latex-image-1.pdf"/>
+                <p:cNvPicPr>
+                  <a:picLocks noChangeAspect="1"/>
+                </p:cNvPicPr>
+                <p:nvPr/>
+              </p:nvPicPr>
+              <p:blipFill>
+                <a:blip r:embed="rId3">
+                  <a:extLst>
+                    <a:ext uri="{28A0092B-C50C-407E-A947-70E740481C1C}">
+                      <a14:useLocalDpi xmlns:a14="http://schemas.microsoft.com/office/drawing/2010/main" val="0"/>
+                    </a:ext>
+                  </a:extLst>
+                </a:blip>
+                <a:stretch>
+                  <a:fillRect/>
+                </a:stretch>
+              </p:blipFill>
+              <p:spPr>
+                <a:xfrm>
+                  <a:off x="6643169" y="923330"/>
+                  <a:ext cx="1048865" cy="396000"/>
+                </a:xfrm>
+                <a:prstGeom prst="rect">
+                  <a:avLst/>
+                </a:prstGeom>
+              </p:spPr>
+            </p:pic>
+          </p:grpSp>
+          <p:cxnSp>
+            <p:nvCxnSpPr>
+              <p:cNvPr id="62" name="Straight Arrow Connector 61"/>
+              <p:cNvCxnSpPr/>
+              <p:nvPr/>
+            </p:nvCxnSpPr>
+            <p:spPr>
+              <a:xfrm>
+                <a:off x="1042802" y="1926949"/>
+                <a:ext cx="2782585" cy="0"/>
+              </a:xfrm>
+              <a:prstGeom prst="straightConnector1">
+                <a:avLst/>
+              </a:prstGeom>
+              <a:ln>
+                <a:solidFill>
+                  <a:srgbClr val="000000"/>
+                </a:solidFill>
+                <a:headEnd type="arrow"/>
+                <a:tailEnd type="arrow"/>
+              </a:ln>
+              <a:effectLst/>
+            </p:spPr>
+            <p:style>
+              <a:lnRef idx="2">
+                <a:schemeClr val="accent1"/>
+              </a:lnRef>
+              <a:fillRef idx="0">
+                <a:schemeClr val="accent1"/>
+              </a:fillRef>
+              <a:effectRef idx="1">
+                <a:schemeClr val="accent1"/>
+              </a:effectRef>
+              <a:fontRef idx="minor">
+                <a:schemeClr val="tx1"/>
+              </a:fontRef>
+            </p:style>
+          </p:cxnSp>
+          <p:sp>
+            <p:nvSpPr>
+              <p:cNvPr id="63" name="TextBox 62"/>
+              <p:cNvSpPr txBox="1"/>
+              <p:nvPr/>
+            </p:nvSpPr>
+            <p:spPr>
+              <a:xfrm>
+                <a:off x="2251040" y="1523436"/>
+                <a:ext cx="406081" cy="400110"/>
+              </a:xfrm>
+              <a:prstGeom prst="rect">
+                <a:avLst/>
+              </a:prstGeom>
+              <a:noFill/>
+            </p:spPr>
+            <p:txBody>
+              <a:bodyPr wrap="none" rtlCol="0">
+                <a:spAutoFit/>
+              </a:bodyPr>
+              <a:lstStyle/>
+              <a:p>
+                <a:r>
+                  <a:rPr lang="en-US" sz="2000" dirty="0" smtClean="0"/>
+                  <a:t>d</a:t>
+                </a:r>
+                <a:r>
+                  <a:rPr lang="en-US" sz="2000" baseline="-25000" dirty="0" smtClean="0"/>
+                  <a:t>1</a:t>
+                </a:r>
+                <a:endParaRPr lang="en-US" sz="2000" baseline="-25000" dirty="0"/>
+              </a:p>
+            </p:txBody>
+          </p:sp>
+          <p:cxnSp>
+            <p:nvCxnSpPr>
+              <p:cNvPr id="64" name="Straight Arrow Connector 63"/>
+              <p:cNvCxnSpPr/>
+              <p:nvPr/>
+            </p:nvCxnSpPr>
+            <p:spPr>
+              <a:xfrm>
+                <a:off x="4131101" y="1923546"/>
+                <a:ext cx="2718392" cy="0"/>
+              </a:xfrm>
+              <a:prstGeom prst="straightConnector1">
+                <a:avLst/>
+              </a:prstGeom>
+              <a:ln>
+                <a:solidFill>
+                  <a:srgbClr val="000000"/>
+                </a:solidFill>
+                <a:headEnd type="arrow"/>
+                <a:tailEnd type="arrow"/>
+              </a:ln>
+              <a:effectLst/>
+            </p:spPr>
+            <p:style>
+              <a:lnRef idx="2">
+                <a:schemeClr val="accent1"/>
+              </a:lnRef>
+              <a:fillRef idx="0">
+                <a:schemeClr val="accent1"/>
+              </a:fillRef>
+              <a:effectRef idx="1">
+                <a:schemeClr val="accent1"/>
+              </a:effectRef>
+              <a:fontRef idx="minor">
+                <a:schemeClr val="tx1"/>
+              </a:fontRef>
+            </p:style>
+          </p:cxnSp>
+          <p:sp>
+            <p:nvSpPr>
+              <p:cNvPr id="65" name="TextBox 64"/>
+              <p:cNvSpPr txBox="1"/>
+              <p:nvPr/>
+            </p:nvSpPr>
+            <p:spPr>
+              <a:xfrm>
+                <a:off x="5364572" y="1520033"/>
+                <a:ext cx="406081" cy="400110"/>
+              </a:xfrm>
+              <a:prstGeom prst="rect">
+                <a:avLst/>
+              </a:prstGeom>
+              <a:noFill/>
+            </p:spPr>
+            <p:txBody>
+              <a:bodyPr wrap="none" rtlCol="0">
+                <a:spAutoFit/>
+              </a:bodyPr>
+              <a:lstStyle/>
+              <a:p>
+                <a:r>
+                  <a:rPr lang="en-US" sz="2000" dirty="0" smtClean="0"/>
+                  <a:t>d</a:t>
+                </a:r>
+                <a:r>
+                  <a:rPr lang="en-US" sz="2000" baseline="-25000" dirty="0" smtClean="0"/>
+                  <a:t>2</a:t>
+                </a:r>
+                <a:endParaRPr lang="en-US" sz="2000" baseline="-25000" dirty="0"/>
+              </a:p>
+            </p:txBody>
+          </p:sp>
+          <p:sp>
+            <p:nvSpPr>
+              <p:cNvPr id="66" name="Right Brace 65"/>
+              <p:cNvSpPr/>
+              <p:nvPr/>
+            </p:nvSpPr>
+            <p:spPr>
+              <a:xfrm rot="16200000">
+                <a:off x="3866369" y="2678903"/>
+                <a:ext cx="169465" cy="359999"/>
+              </a:xfrm>
+              <a:prstGeom prst="rightBrace">
+                <a:avLst/>
+              </a:prstGeom>
+              <a:ln>
+                <a:solidFill>
+                  <a:srgbClr val="000000"/>
+                </a:solidFill>
+              </a:ln>
+              <a:effectLst/>
+            </p:spPr>
+            <p:style>
+              <a:lnRef idx="2">
+                <a:schemeClr val="accent1"/>
+              </a:lnRef>
+              <a:fillRef idx="0">
+                <a:schemeClr val="accent1"/>
+              </a:fillRef>
+              <a:effectRef idx="1">
+                <a:schemeClr val="accent1"/>
+              </a:effectRef>
+              <a:fontRef idx="minor">
+                <a:schemeClr val="tx1"/>
+              </a:fontRef>
+            </p:style>
+            <p:txBody>
+              <a:bodyPr rtlCol="0" anchor="ctr"/>
+              <a:lstStyle/>
+              <a:p>
+                <a:pPr algn="ctr"/>
+                <a:endParaRPr lang="en-US"/>
+              </a:p>
+            </p:txBody>
+          </p:sp>
+          <p:sp>
+            <p:nvSpPr>
+              <p:cNvPr id="67" name="TextBox 66"/>
+              <p:cNvSpPr txBox="1"/>
+              <p:nvPr/>
+            </p:nvSpPr>
+            <p:spPr>
+              <a:xfrm>
+                <a:off x="3763084" y="2372094"/>
+                <a:ext cx="404077" cy="400110"/>
+              </a:xfrm>
+              <a:prstGeom prst="rect">
+                <a:avLst/>
+              </a:prstGeom>
+              <a:noFill/>
+            </p:spPr>
+            <p:txBody>
+              <a:bodyPr wrap="none" rtlCol="0">
+                <a:spAutoFit/>
+              </a:bodyPr>
+              <a:lstStyle/>
+              <a:p>
+                <a:r>
+                  <a:rPr lang="en-US" sz="2000" dirty="0" smtClean="0"/>
+                  <a:t>2r</a:t>
+                </a:r>
+                <a:endParaRPr lang="en-US" sz="2000" baseline="-25000" dirty="0"/>
+              </a:p>
+            </p:txBody>
+          </p:sp>
+          <p:sp>
+            <p:nvSpPr>
+              <p:cNvPr id="68" name="Right Brace 67"/>
+              <p:cNvSpPr/>
+              <p:nvPr/>
+            </p:nvSpPr>
+            <p:spPr>
+              <a:xfrm rot="16200000">
+                <a:off x="6952778" y="2478848"/>
+                <a:ext cx="169465" cy="359999"/>
+              </a:xfrm>
+              <a:prstGeom prst="rightBrace">
+                <a:avLst/>
+              </a:prstGeom>
+              <a:ln>
+                <a:solidFill>
+                  <a:srgbClr val="000000"/>
+                </a:solidFill>
+              </a:ln>
+              <a:effectLst/>
+            </p:spPr>
+            <p:style>
+              <a:lnRef idx="2">
+                <a:schemeClr val="accent1"/>
+              </a:lnRef>
+              <a:fillRef idx="0">
+                <a:schemeClr val="accent1"/>
+              </a:fillRef>
+              <a:effectRef idx="1">
+                <a:schemeClr val="accent1"/>
+              </a:effectRef>
+              <a:fontRef idx="minor">
+                <a:schemeClr val="tx1"/>
+              </a:fontRef>
+            </p:style>
+            <p:txBody>
+              <a:bodyPr rtlCol="0" anchor="ctr"/>
+              <a:lstStyle/>
+              <a:p>
+                <a:pPr algn="ctr"/>
+                <a:endParaRPr lang="en-US"/>
+              </a:p>
+            </p:txBody>
+          </p:sp>
+          <p:sp>
+            <p:nvSpPr>
+              <p:cNvPr id="69" name="TextBox 68"/>
+              <p:cNvSpPr txBox="1"/>
+              <p:nvPr/>
+            </p:nvSpPr>
+            <p:spPr>
+              <a:xfrm>
+                <a:off x="6822755" y="2172039"/>
+                <a:ext cx="453970" cy="400110"/>
+              </a:xfrm>
+              <a:prstGeom prst="rect">
+                <a:avLst/>
+              </a:prstGeom>
+              <a:noFill/>
+            </p:spPr>
+            <p:txBody>
+              <a:bodyPr wrap="none" rtlCol="0">
+                <a:spAutoFit/>
+              </a:bodyPr>
+              <a:lstStyle/>
+              <a:p>
+                <a:r>
+                  <a:rPr lang="en-US" sz="2000" dirty="0" smtClean="0"/>
+                  <a:t>2R</a:t>
+                </a:r>
+                <a:endParaRPr lang="en-US" sz="2000" baseline="-25000" dirty="0"/>
+              </a:p>
+            </p:txBody>
+          </p:sp>
+        </p:grpSp>
+        <p:pic>
+          <p:nvPicPr>
+            <p:cNvPr id="51" name="Picture 50" descr="latex-image-1.pdf"/>
+            <p:cNvPicPr>
+              <a:picLocks noChangeAspect="1"/>
+            </p:cNvPicPr>
             <p:nvPr/>
-          </p:nvCxnSpPr>
+          </p:nvPicPr>
+          <p:blipFill>
+            <a:blip r:embed="rId4">
+              <a:extLst>
+                <a:ext uri="{28A0092B-C50C-407E-A947-70E740481C1C}">
+                  <a14:useLocalDpi xmlns:a14="http://schemas.microsoft.com/office/drawing/2010/main" val="0"/>
+                </a:ext>
+              </a:extLst>
+            </a:blip>
+            <a:stretch>
+              <a:fillRect/>
+            </a:stretch>
+          </p:blipFill>
           <p:spPr>
             <a:xfrm>
-              <a:off x="2435182" y="941810"/>
-              <a:ext cx="0" cy="2762936"/>
+              <a:off x="3731804" y="4919187"/>
+              <a:ext cx="2381653" cy="810775"/>
             </a:xfrm>
-            <a:prstGeom prst="line">
+            <a:prstGeom prst="rect">
               <a:avLst/>
             </a:prstGeom>
-            <a:ln>
-              <a:solidFill>
-                <a:schemeClr val="tx1"/>
-              </a:solidFill>
-            </a:ln>
-            <a:effectLst/>
           </p:spPr>
-          <p:style>
-            <a:lnRef idx="2">
-              <a:schemeClr val="accent1"/>
-            </a:lnRef>
-            <a:fillRef idx="0">
-              <a:schemeClr val="accent1"/>
-            </a:fillRef>
-            <a:effectRef idx="1">
-              <a:schemeClr val="accent1"/>
-            </a:effectRef>
-            <a:fontRef idx="minor">
-              <a:schemeClr val="tx1"/>
-            </a:fontRef>
-          </p:style>
-        </p:cxnSp>
-        <p:cxnSp>
-          <p:nvCxnSpPr>
-            <p:cNvPr id="8" name="Straight Connector 7"/>
-            <p:cNvCxnSpPr/>
-            <p:nvPr/>
-          </p:nvCxnSpPr>
-          <p:spPr>
-            <a:xfrm flipV="1">
-              <a:off x="1115645" y="941810"/>
-              <a:ext cx="1319537" cy="877265"/>
-            </a:xfrm>
-            <a:prstGeom prst="line">
-              <a:avLst/>
-            </a:prstGeom>
-            <a:ln>
-              <a:solidFill>
-                <a:schemeClr val="tx1"/>
-              </a:solidFill>
-            </a:ln>
-            <a:effectLst/>
-          </p:spPr>
-          <p:style>
-            <a:lnRef idx="2">
-              <a:schemeClr val="accent1"/>
-            </a:lnRef>
-            <a:fillRef idx="0">
-              <a:schemeClr val="accent1"/>
-            </a:fillRef>
-            <a:effectRef idx="1">
-              <a:schemeClr val="accent1"/>
-            </a:effectRef>
-            <a:fontRef idx="minor">
-              <a:schemeClr val="tx1"/>
-            </a:fontRef>
-          </p:style>
-        </p:cxnSp>
-        <p:cxnSp>
-          <p:nvCxnSpPr>
-            <p:cNvPr id="10" name="Straight Connector 9"/>
-            <p:cNvCxnSpPr/>
-            <p:nvPr/>
-          </p:nvCxnSpPr>
-          <p:spPr>
-            <a:xfrm flipV="1">
-              <a:off x="1115645" y="3704746"/>
-              <a:ext cx="1319537" cy="877265"/>
-            </a:xfrm>
-            <a:prstGeom prst="line">
-              <a:avLst/>
-            </a:prstGeom>
-            <a:ln>
-              <a:solidFill>
-                <a:schemeClr val="tx1"/>
-              </a:solidFill>
-            </a:ln>
-            <a:effectLst/>
-          </p:spPr>
-          <p:style>
-            <a:lnRef idx="2">
-              <a:schemeClr val="accent1"/>
-            </a:lnRef>
-            <a:fillRef idx="0">
-              <a:schemeClr val="accent1"/>
-            </a:fillRef>
-            <a:effectRef idx="1">
-              <a:schemeClr val="accent1"/>
-            </a:effectRef>
-            <a:fontRef idx="minor">
-              <a:schemeClr val="tx1"/>
-            </a:fontRef>
-          </p:style>
-        </p:cxnSp>
+        </p:pic>
       </p:grpSp>
-      <p:grpSp>
-        <p:nvGrpSpPr>
-          <p:cNvPr id="12" name="Group 11"/>
-          <p:cNvGrpSpPr/>
-          <p:nvPr/>
-        </p:nvGrpSpPr>
-        <p:grpSpPr>
-          <a:xfrm>
-            <a:off x="3297575" y="172212"/>
-            <a:ext cx="1275288" cy="3394833"/>
-            <a:chOff x="1115645" y="941810"/>
-            <a:chExt cx="1319537" cy="3640201"/>
-          </a:xfrm>
-        </p:grpSpPr>
-        <p:cxnSp>
-          <p:nvCxnSpPr>
-            <p:cNvPr id="13" name="Straight Connector 12"/>
-            <p:cNvCxnSpPr/>
-            <p:nvPr/>
-          </p:nvCxnSpPr>
-          <p:spPr>
-            <a:xfrm>
-              <a:off x="1115645" y="1819075"/>
-              <a:ext cx="0" cy="2762936"/>
-            </a:xfrm>
-            <a:prstGeom prst="line">
-              <a:avLst/>
-            </a:prstGeom>
-            <a:ln>
-              <a:solidFill>
-                <a:schemeClr val="tx1"/>
-              </a:solidFill>
-            </a:ln>
-            <a:effectLst/>
-          </p:spPr>
-          <p:style>
-            <a:lnRef idx="2">
-              <a:schemeClr val="accent1"/>
-            </a:lnRef>
-            <a:fillRef idx="0">
-              <a:schemeClr val="accent1"/>
-            </a:fillRef>
-            <a:effectRef idx="1">
-              <a:schemeClr val="accent1"/>
-            </a:effectRef>
-            <a:fontRef idx="minor">
-              <a:schemeClr val="tx1"/>
-            </a:fontRef>
-          </p:style>
-        </p:cxnSp>
-        <p:cxnSp>
-          <p:nvCxnSpPr>
-            <p:cNvPr id="14" name="Straight Connector 13"/>
-            <p:cNvCxnSpPr/>
-            <p:nvPr/>
-          </p:nvCxnSpPr>
-          <p:spPr>
-            <a:xfrm>
-              <a:off x="2435182" y="941810"/>
-              <a:ext cx="0" cy="2762936"/>
-            </a:xfrm>
-            <a:prstGeom prst="line">
-              <a:avLst/>
-            </a:prstGeom>
-            <a:ln>
-              <a:solidFill>
-                <a:schemeClr val="tx1"/>
-              </a:solidFill>
-            </a:ln>
-            <a:effectLst/>
-          </p:spPr>
-          <p:style>
-            <a:lnRef idx="2">
-              <a:schemeClr val="accent1"/>
-            </a:lnRef>
-            <a:fillRef idx="0">
-              <a:schemeClr val="accent1"/>
-            </a:fillRef>
-            <a:effectRef idx="1">
-              <a:schemeClr val="accent1"/>
-            </a:effectRef>
-            <a:fontRef idx="minor">
-              <a:schemeClr val="tx1"/>
-            </a:fontRef>
-          </p:style>
-        </p:cxnSp>
-        <p:cxnSp>
-          <p:nvCxnSpPr>
-            <p:cNvPr id="15" name="Straight Connector 14"/>
-            <p:cNvCxnSpPr/>
-            <p:nvPr/>
-          </p:nvCxnSpPr>
-          <p:spPr>
-            <a:xfrm flipV="1">
-              <a:off x="1115645" y="941810"/>
-              <a:ext cx="1319537" cy="877265"/>
-            </a:xfrm>
-            <a:prstGeom prst="line">
-              <a:avLst/>
-            </a:prstGeom>
-            <a:ln>
-              <a:solidFill>
-                <a:schemeClr val="tx1"/>
-              </a:solidFill>
-            </a:ln>
-            <a:effectLst/>
-          </p:spPr>
-          <p:style>
-            <a:lnRef idx="2">
-              <a:schemeClr val="accent1"/>
-            </a:lnRef>
-            <a:fillRef idx="0">
-              <a:schemeClr val="accent1"/>
-            </a:fillRef>
-            <a:effectRef idx="1">
-              <a:schemeClr val="accent1"/>
-            </a:effectRef>
-            <a:fontRef idx="minor">
-              <a:schemeClr val="tx1"/>
-            </a:fontRef>
-          </p:style>
-        </p:cxnSp>
-        <p:cxnSp>
-          <p:nvCxnSpPr>
-            <p:cNvPr id="16" name="Straight Connector 15"/>
-            <p:cNvCxnSpPr/>
-            <p:nvPr/>
-          </p:nvCxnSpPr>
-          <p:spPr>
-            <a:xfrm flipV="1">
-              <a:off x="1115645" y="3704746"/>
-              <a:ext cx="1319537" cy="877265"/>
-            </a:xfrm>
-            <a:prstGeom prst="line">
-              <a:avLst/>
-            </a:prstGeom>
-            <a:ln>
-              <a:solidFill>
-                <a:schemeClr val="tx1"/>
-              </a:solidFill>
-            </a:ln>
-            <a:effectLst/>
-          </p:spPr>
-          <p:style>
-            <a:lnRef idx="2">
-              <a:schemeClr val="accent1"/>
-            </a:lnRef>
-            <a:fillRef idx="0">
-              <a:schemeClr val="accent1"/>
-            </a:fillRef>
-            <a:effectRef idx="1">
-              <a:schemeClr val="accent1"/>
-            </a:effectRef>
-            <a:fontRef idx="minor">
-              <a:schemeClr val="tx1"/>
-            </a:fontRef>
-          </p:style>
-        </p:cxnSp>
-      </p:grpSp>
-      <p:grpSp>
-        <p:nvGrpSpPr>
-          <p:cNvPr id="17" name="Group 16"/>
-          <p:cNvGrpSpPr/>
-          <p:nvPr/>
-        </p:nvGrpSpPr>
-        <p:grpSpPr>
-          <a:xfrm>
-            <a:off x="6364391" y="172212"/>
-            <a:ext cx="1275288" cy="3394833"/>
-            <a:chOff x="1115645" y="941810"/>
-            <a:chExt cx="1319537" cy="3640201"/>
-          </a:xfrm>
-        </p:grpSpPr>
-        <p:cxnSp>
-          <p:nvCxnSpPr>
-            <p:cNvPr id="18" name="Straight Connector 17"/>
-            <p:cNvCxnSpPr/>
-            <p:nvPr/>
-          </p:nvCxnSpPr>
-          <p:spPr>
-            <a:xfrm>
-              <a:off x="1115645" y="1819075"/>
-              <a:ext cx="0" cy="2762936"/>
-            </a:xfrm>
-            <a:prstGeom prst="line">
-              <a:avLst/>
-            </a:prstGeom>
-            <a:ln>
-              <a:solidFill>
-                <a:schemeClr val="tx1"/>
-              </a:solidFill>
-            </a:ln>
-            <a:effectLst/>
-          </p:spPr>
-          <p:style>
-            <a:lnRef idx="2">
-              <a:schemeClr val="accent1"/>
-            </a:lnRef>
-            <a:fillRef idx="0">
-              <a:schemeClr val="accent1"/>
-            </a:fillRef>
-            <a:effectRef idx="1">
-              <a:schemeClr val="accent1"/>
-            </a:effectRef>
-            <a:fontRef idx="minor">
-              <a:schemeClr val="tx1"/>
-            </a:fontRef>
-          </p:style>
-        </p:cxnSp>
-        <p:cxnSp>
-          <p:nvCxnSpPr>
-            <p:cNvPr id="19" name="Straight Connector 18"/>
-            <p:cNvCxnSpPr/>
-            <p:nvPr/>
-          </p:nvCxnSpPr>
-          <p:spPr>
-            <a:xfrm>
-              <a:off x="2435182" y="941810"/>
-              <a:ext cx="0" cy="2762936"/>
-            </a:xfrm>
-            <a:prstGeom prst="line">
-              <a:avLst/>
-            </a:prstGeom>
-            <a:ln>
-              <a:solidFill>
-                <a:schemeClr val="tx1"/>
-              </a:solidFill>
-            </a:ln>
-            <a:effectLst/>
-          </p:spPr>
-          <p:style>
-            <a:lnRef idx="2">
-              <a:schemeClr val="accent1"/>
-            </a:lnRef>
-            <a:fillRef idx="0">
-              <a:schemeClr val="accent1"/>
-            </a:fillRef>
-            <a:effectRef idx="1">
-              <a:schemeClr val="accent1"/>
-            </a:effectRef>
-            <a:fontRef idx="minor">
-              <a:schemeClr val="tx1"/>
-            </a:fontRef>
-          </p:style>
-        </p:cxnSp>
-        <p:cxnSp>
-          <p:nvCxnSpPr>
-            <p:cNvPr id="20" name="Straight Connector 19"/>
-            <p:cNvCxnSpPr/>
-            <p:nvPr/>
-          </p:nvCxnSpPr>
-          <p:spPr>
-            <a:xfrm flipV="1">
-              <a:off x="1115645" y="941810"/>
-              <a:ext cx="1319537" cy="877265"/>
-            </a:xfrm>
-            <a:prstGeom prst="line">
-              <a:avLst/>
-            </a:prstGeom>
-            <a:ln>
-              <a:solidFill>
-                <a:schemeClr val="tx1"/>
-              </a:solidFill>
-            </a:ln>
-            <a:effectLst/>
-          </p:spPr>
-          <p:style>
-            <a:lnRef idx="2">
-              <a:schemeClr val="accent1"/>
-            </a:lnRef>
-            <a:fillRef idx="0">
-              <a:schemeClr val="accent1"/>
-            </a:fillRef>
-            <a:effectRef idx="1">
-              <a:schemeClr val="accent1"/>
-            </a:effectRef>
-            <a:fontRef idx="minor">
-              <a:schemeClr val="tx1"/>
-            </a:fontRef>
-          </p:style>
-        </p:cxnSp>
-        <p:cxnSp>
-          <p:nvCxnSpPr>
-            <p:cNvPr id="21" name="Straight Connector 20"/>
-            <p:cNvCxnSpPr/>
-            <p:nvPr/>
-          </p:nvCxnSpPr>
-          <p:spPr>
-            <a:xfrm flipV="1">
-              <a:off x="1115645" y="3704746"/>
-              <a:ext cx="1319537" cy="877265"/>
-            </a:xfrm>
-            <a:prstGeom prst="line">
-              <a:avLst/>
-            </a:prstGeom>
-            <a:ln>
-              <a:solidFill>
-                <a:schemeClr val="tx1"/>
-              </a:solidFill>
-            </a:ln>
-            <a:effectLst/>
-          </p:spPr>
-          <p:style>
-            <a:lnRef idx="2">
-              <a:schemeClr val="accent1"/>
-            </a:lnRef>
-            <a:fillRef idx="0">
-              <a:schemeClr val="accent1"/>
-            </a:fillRef>
-            <a:effectRef idx="1">
-              <a:schemeClr val="accent1"/>
-            </a:effectRef>
-            <a:fontRef idx="minor">
-              <a:schemeClr val="tx1"/>
-            </a:fontRef>
-          </p:style>
-        </p:cxnSp>
-      </p:grpSp>
-      <p:sp>
-        <p:nvSpPr>
-          <p:cNvPr id="22" name="TextBox 21"/>
-          <p:cNvSpPr txBox="1"/>
-          <p:nvPr/>
-        </p:nvSpPr>
-        <p:spPr>
-          <a:xfrm>
-            <a:off x="228753" y="3918698"/>
-            <a:ext cx="1147670" cy="507831"/>
-          </a:xfrm>
-          <a:prstGeom prst="rect">
-            <a:avLst/>
-          </a:prstGeom>
-          <a:noFill/>
-        </p:spPr>
-        <p:txBody>
-          <a:bodyPr wrap="none" rtlCol="0">
-            <a:spAutoFit/>
-          </a:bodyPr>
-          <a:lstStyle/>
-          <a:p>
-            <a:pPr algn="ctr"/>
-            <a:r>
-              <a:rPr lang="en-US" sz="2700" dirty="0" smtClean="0"/>
-              <a:t>Source</a:t>
-            </a:r>
-            <a:endParaRPr lang="en-US" sz="2700" dirty="0"/>
-          </a:p>
-        </p:txBody>
-      </p:sp>
-      <p:sp>
-        <p:nvSpPr>
-          <p:cNvPr id="23" name="TextBox 22"/>
-          <p:cNvSpPr txBox="1"/>
-          <p:nvPr/>
-        </p:nvSpPr>
-        <p:spPr>
-          <a:xfrm>
-            <a:off x="3129909" y="3726278"/>
-            <a:ext cx="1604374" cy="1092810"/>
-          </a:xfrm>
-          <a:prstGeom prst="rect">
-            <a:avLst/>
-          </a:prstGeom>
-          <a:noFill/>
-        </p:spPr>
-        <p:txBody>
-          <a:bodyPr wrap="none" rtlCol="0">
-            <a:spAutoFit/>
-          </a:bodyPr>
-          <a:lstStyle/>
-          <a:p>
-            <a:pPr algn="ctr"/>
-            <a:r>
-              <a:rPr lang="en-US" sz="2700" dirty="0"/>
-              <a:t>Finite </a:t>
-            </a:r>
-          </a:p>
-          <a:p>
-            <a:pPr algn="ctr"/>
-            <a:r>
-              <a:rPr lang="en-US" sz="2700" dirty="0"/>
-              <a:t>Aperture</a:t>
-            </a:r>
-          </a:p>
-        </p:txBody>
-      </p:sp>
-      <p:sp>
-        <p:nvSpPr>
-          <p:cNvPr id="24" name="TextBox 23"/>
-          <p:cNvSpPr txBox="1"/>
-          <p:nvPr/>
-        </p:nvSpPr>
-        <p:spPr>
-          <a:xfrm>
-            <a:off x="6148206" y="3726278"/>
-            <a:ext cx="1701407" cy="1092810"/>
-          </a:xfrm>
-          <a:prstGeom prst="rect">
-            <a:avLst/>
-          </a:prstGeom>
-          <a:noFill/>
-        </p:spPr>
-        <p:txBody>
-          <a:bodyPr wrap="none" rtlCol="0">
-            <a:spAutoFit/>
-          </a:bodyPr>
-          <a:lstStyle/>
-          <a:p>
-            <a:pPr algn="ctr"/>
-            <a:r>
-              <a:rPr lang="en-US" sz="2700" dirty="0"/>
-              <a:t>Projected</a:t>
-            </a:r>
-          </a:p>
-          <a:p>
-            <a:pPr algn="ctr"/>
-            <a:r>
-              <a:rPr lang="en-US" sz="2700" dirty="0"/>
-              <a:t>Image</a:t>
-            </a:r>
-          </a:p>
-        </p:txBody>
-      </p:sp>
-      <p:sp>
-        <p:nvSpPr>
-          <p:cNvPr id="25" name="Oval 24"/>
-          <p:cNvSpPr>
-            <a:spLocks noChangeAspect="1"/>
-          </p:cNvSpPr>
-          <p:nvPr/>
-        </p:nvSpPr>
-        <p:spPr>
-          <a:xfrm>
-            <a:off x="3825387" y="1767950"/>
-            <a:ext cx="189728" cy="359999"/>
-          </a:xfrm>
-          <a:prstGeom prst="ellipse">
-            <a:avLst/>
-          </a:prstGeom>
-          <a:solidFill>
-            <a:schemeClr val="tx1"/>
-          </a:solidFill>
-          <a:ln>
-            <a:solidFill>
-              <a:srgbClr val="000000"/>
-            </a:solidFill>
-          </a:ln>
-          <a:effectLst/>
-        </p:spPr>
-        <p:style>
-          <a:lnRef idx="1">
-            <a:schemeClr val="accent1"/>
-          </a:lnRef>
-          <a:fillRef idx="3">
-            <a:schemeClr val="accent1"/>
-          </a:fillRef>
-          <a:effectRef idx="2">
-            <a:schemeClr val="accent1"/>
-          </a:effectRef>
-          <a:fontRef idx="minor">
-            <a:schemeClr val="lt1"/>
-          </a:fontRef>
-        </p:style>
-        <p:txBody>
-          <a:bodyPr rtlCol="0" anchor="ctr"/>
-          <a:lstStyle/>
-          <a:p>
-            <a:pPr algn="ctr"/>
-            <a:endParaRPr lang="en-US"/>
-          </a:p>
-        </p:txBody>
-      </p:sp>
-      <p:cxnSp>
-        <p:nvCxnSpPr>
-          <p:cNvPr id="27" name="Straight Connector 26"/>
-          <p:cNvCxnSpPr>
-            <a:endCxn id="31" idx="0"/>
-          </p:cNvCxnSpPr>
-          <p:nvPr/>
-        </p:nvCxnSpPr>
-        <p:spPr>
-          <a:xfrm flipV="1">
-            <a:off x="901583" y="1506761"/>
-            <a:ext cx="6137640" cy="492314"/>
-          </a:xfrm>
-          <a:prstGeom prst="line">
-            <a:avLst/>
-          </a:prstGeom>
-          <a:ln>
-            <a:solidFill>
-              <a:srgbClr val="000000"/>
-            </a:solidFill>
-            <a:prstDash val="dash"/>
-            <a:headEnd type="none"/>
-            <a:tailEnd type="arrow"/>
-          </a:ln>
-          <a:effectLst/>
-        </p:spPr>
-        <p:style>
-          <a:lnRef idx="2">
-            <a:schemeClr val="accent1"/>
-          </a:lnRef>
-          <a:fillRef idx="0">
-            <a:schemeClr val="accent1"/>
-          </a:fillRef>
-          <a:effectRef idx="1">
-            <a:schemeClr val="accent1"/>
-          </a:effectRef>
-          <a:fontRef idx="minor">
-            <a:schemeClr val="tx1"/>
-          </a:fontRef>
-        </p:style>
-      </p:cxnSp>
-      <p:cxnSp>
-        <p:nvCxnSpPr>
-          <p:cNvPr id="28" name="Straight Connector 27"/>
-          <p:cNvCxnSpPr>
-            <a:endCxn id="31" idx="4"/>
-          </p:cNvCxnSpPr>
-          <p:nvPr/>
-        </p:nvCxnSpPr>
-        <p:spPr>
-          <a:xfrm>
-            <a:off x="901583" y="1999074"/>
-            <a:ext cx="6137640" cy="227686"/>
-          </a:xfrm>
-          <a:prstGeom prst="line">
-            <a:avLst/>
-          </a:prstGeom>
-          <a:ln>
-            <a:solidFill>
-              <a:srgbClr val="000000"/>
-            </a:solidFill>
-            <a:prstDash val="dash"/>
-            <a:headEnd type="none"/>
-            <a:tailEnd type="arrow"/>
-          </a:ln>
-          <a:effectLst/>
-        </p:spPr>
-        <p:style>
-          <a:lnRef idx="2">
-            <a:schemeClr val="accent1"/>
-          </a:lnRef>
-          <a:fillRef idx="0">
-            <a:schemeClr val="accent1"/>
-          </a:fillRef>
-          <a:effectRef idx="1">
-            <a:schemeClr val="accent1"/>
-          </a:effectRef>
-          <a:fontRef idx="minor">
-            <a:schemeClr val="tx1"/>
-          </a:fontRef>
-        </p:style>
-      </p:cxnSp>
-      <p:sp>
-        <p:nvSpPr>
-          <p:cNvPr id="31" name="Oval 30"/>
-          <p:cNvSpPr>
-            <a:spLocks noChangeAspect="1"/>
-          </p:cNvSpPr>
-          <p:nvPr/>
-        </p:nvSpPr>
-        <p:spPr>
-          <a:xfrm>
-            <a:off x="6849493" y="1506761"/>
-            <a:ext cx="379457" cy="720000"/>
-          </a:xfrm>
-          <a:prstGeom prst="ellipse">
-            <a:avLst/>
-          </a:prstGeom>
-          <a:solidFill>
-            <a:schemeClr val="tx1"/>
-          </a:solidFill>
-          <a:ln>
-            <a:solidFill>
-              <a:srgbClr val="000000"/>
-            </a:solidFill>
-          </a:ln>
-          <a:effectLst/>
-        </p:spPr>
-        <p:style>
-          <a:lnRef idx="1">
-            <a:schemeClr val="accent1"/>
-          </a:lnRef>
-          <a:fillRef idx="3">
-            <a:schemeClr val="accent1"/>
-          </a:fillRef>
-          <a:effectRef idx="2">
-            <a:schemeClr val="accent1"/>
-          </a:effectRef>
-          <a:fontRef idx="minor">
-            <a:schemeClr val="lt1"/>
-          </a:fontRef>
-        </p:style>
-        <p:txBody>
-          <a:bodyPr rtlCol="0" anchor="ctr"/>
-          <a:lstStyle/>
-          <a:p>
-            <a:pPr algn="ctr"/>
-            <a:endParaRPr lang="en-US"/>
-          </a:p>
-        </p:txBody>
-      </p:sp>
-      <p:pic>
-        <p:nvPicPr>
-          <p:cNvPr id="2" name="Picture 1" descr="latex-image-1.pdf"/>
-          <p:cNvPicPr>
-            <a:picLocks noChangeAspect="1"/>
-          </p:cNvPicPr>
-          <p:nvPr/>
-        </p:nvPicPr>
-        <p:blipFill>
-          <a:blip r:embed="rId3">
-            <a:extLst>
-              <a:ext uri="{28A0092B-C50C-407E-A947-70E740481C1C}">
-                <a14:useLocalDpi xmlns:a14="http://schemas.microsoft.com/office/drawing/2010/main" val="0"/>
-              </a:ext>
-            </a:extLst>
-          </a:blip>
-          <a:stretch>
-            <a:fillRect/>
-          </a:stretch>
-        </p:blipFill>
-        <p:spPr>
-          <a:xfrm>
-            <a:off x="231174" y="4686762"/>
-            <a:ext cx="1059567" cy="396000"/>
-          </a:xfrm>
-          <a:prstGeom prst="rect">
-            <a:avLst/>
-          </a:prstGeom>
-        </p:spPr>
-      </p:pic>
     </p:spTree>
     <p:extLst>
       <p:ext uri="{BB962C8B-B14F-4D97-AF65-F5344CB8AC3E}">

</xml_diff>

<commit_message>
With history complete in lecture 1
</commit_message>
<xml_diff>
--- a/Lecture_1/images/pinhole_projection.pptx
+++ b/Lecture_1/images/pinhole_projection.pptx
@@ -7,7 +7,7 @@
   <p:sldIdLst>
     <p:sldId id="256" r:id="rId2"/>
   </p:sldIdLst>
-  <p:sldSz cx="7991475" cy="5761038"/>
+  <p:sldSz cx="8459788" cy="5761038"/>
   <p:notesSz cx="6858000" cy="9144000"/>
   <p:defaultTextStyle>
     <a:defPPr>
@@ -104,6 +104,22 @@
       </a:defRPr>
     </a:lvl9pPr>
   </p:defaultTextStyle>
+  <p:extLst>
+    <p:ext uri="{EFAFB233-063F-42B5-8137-9DF3F51BA10A}">
+      <p15:sldGuideLst xmlns:p15="http://schemas.microsoft.com/office/powerpoint/2012/main">
+        <p15:guide id="1" orient="horz" pos="1815" userDrawn="1">
+          <p15:clr>
+            <a:srgbClr val="A4A3A4"/>
+          </p15:clr>
+        </p15:guide>
+        <p15:guide id="2" pos="2665" userDrawn="1">
+          <p15:clr>
+            <a:srgbClr val="A4A3A4"/>
+          </p15:clr>
+        </p15:guide>
+      </p15:sldGuideLst>
+    </p:ext>
+  </p:extLst>
 </p:presentation>
 </file>
 
@@ -136,8 +152,8 @@
         </p:nvSpPr>
         <p:spPr>
           <a:xfrm>
-            <a:off x="599361" y="1789657"/>
-            <a:ext cx="6792754" cy="1234889"/>
+            <a:off x="634485" y="1789658"/>
+            <a:ext cx="7190820" cy="1234889"/>
           </a:xfrm>
         </p:spPr>
         <p:txBody>
@@ -164,8 +180,8 @@
         </p:nvSpPr>
         <p:spPr>
           <a:xfrm>
-            <a:off x="1198722" y="3264589"/>
-            <a:ext cx="5594033" cy="1472265"/>
+            <a:off x="1268970" y="3264590"/>
+            <a:ext cx="5921852" cy="1472265"/>
           </a:xfrm>
         </p:spPr>
         <p:txBody>
@@ -288,7 +304,7 @@
           <a:p>
             <a:fld id="{7F37A421-E2BE-A744-A1A0-937201EFD21E}" type="datetimeFigureOut">
               <a:rPr lang="en-US" smtClean="0"/>
-              <a:t>12/02/18</a:t>
+              <a:t>2/19/18</a:t>
             </a:fld>
             <a:endParaRPr lang="en-US"/>
           </a:p>
@@ -458,7 +474,7 @@
           <a:p>
             <a:fld id="{7F37A421-E2BE-A744-A1A0-937201EFD21E}" type="datetimeFigureOut">
               <a:rPr lang="en-US" smtClean="0"/>
-              <a:t>12/02/18</a:t>
+              <a:t>2/19/18</a:t>
             </a:fld>
             <a:endParaRPr lang="en-US"/>
           </a:p>
@@ -548,8 +564,8 @@
         </p:nvSpPr>
         <p:spPr>
           <a:xfrm>
-            <a:off x="5064043" y="181367"/>
-            <a:ext cx="1570547" cy="3874031"/>
+            <a:off x="5360804" y="181368"/>
+            <a:ext cx="1662584" cy="3874031"/>
           </a:xfrm>
         </p:spPr>
         <p:txBody>
@@ -576,8 +592,8 @@
         </p:nvSpPr>
         <p:spPr>
           <a:xfrm>
-            <a:off x="349627" y="181367"/>
-            <a:ext cx="4581224" cy="3874031"/>
+            <a:off x="370116" y="181368"/>
+            <a:ext cx="4849691" cy="3874031"/>
           </a:xfrm>
         </p:spPr>
         <p:txBody>
@@ -638,7 +654,7 @@
           <a:p>
             <a:fld id="{7F37A421-E2BE-A744-A1A0-937201EFD21E}" type="datetimeFigureOut">
               <a:rPr lang="en-US" smtClean="0"/>
-              <a:t>12/02/18</a:t>
+              <a:t>2/19/18</a:t>
             </a:fld>
             <a:endParaRPr lang="en-US"/>
           </a:p>
@@ -808,7 +824,7 @@
           <a:p>
             <a:fld id="{7F37A421-E2BE-A744-A1A0-937201EFD21E}" type="datetimeFigureOut">
               <a:rPr lang="en-US" smtClean="0"/>
-              <a:t>12/02/18</a:t>
+              <a:t>2/19/18</a:t>
             </a:fld>
             <a:endParaRPr lang="en-US"/>
           </a:p>
@@ -898,8 +914,8 @@
         </p:nvSpPr>
         <p:spPr>
           <a:xfrm>
-            <a:off x="631271" y="3702001"/>
-            <a:ext cx="6792754" cy="1144207"/>
+            <a:off x="668265" y="3702002"/>
+            <a:ext cx="7190820" cy="1144207"/>
           </a:xfrm>
         </p:spPr>
         <p:txBody>
@@ -930,8 +946,8 @@
         </p:nvSpPr>
         <p:spPr>
           <a:xfrm>
-            <a:off x="631271" y="2441773"/>
-            <a:ext cx="6792754" cy="1260227"/>
+            <a:off x="668265" y="2441774"/>
+            <a:ext cx="7190820" cy="1260227"/>
           </a:xfrm>
         </p:spPr>
         <p:txBody>
@@ -1054,7 +1070,7 @@
           <a:p>
             <a:fld id="{7F37A421-E2BE-A744-A1A0-937201EFD21E}" type="datetimeFigureOut">
               <a:rPr lang="en-US" smtClean="0"/>
-              <a:t>12/02/18</a:t>
+              <a:t>2/19/18</a:t>
             </a:fld>
             <a:endParaRPr lang="en-US"/>
           </a:p>
@@ -1167,8 +1183,8 @@
         </p:nvSpPr>
         <p:spPr>
           <a:xfrm>
-            <a:off x="349627" y="1058859"/>
-            <a:ext cx="3075886" cy="2996540"/>
+            <a:off x="370116" y="1058859"/>
+            <a:ext cx="3256138" cy="2996540"/>
           </a:xfrm>
         </p:spPr>
         <p:txBody>
@@ -1252,8 +1268,8 @@
         </p:nvSpPr>
         <p:spPr>
           <a:xfrm>
-            <a:off x="3558706" y="1058859"/>
-            <a:ext cx="3075885" cy="2996540"/>
+            <a:off x="3767252" y="1058859"/>
+            <a:ext cx="3256137" cy="2996540"/>
           </a:xfrm>
         </p:spPr>
         <p:txBody>
@@ -1342,7 +1358,7 @@
           <a:p>
             <a:fld id="{7F37A421-E2BE-A744-A1A0-937201EFD21E}" type="datetimeFigureOut">
               <a:rPr lang="en-US" smtClean="0"/>
-              <a:t>12/02/18</a:t>
+              <a:t>2/19/18</a:t>
             </a:fld>
             <a:endParaRPr lang="en-US"/>
           </a:p>
@@ -1432,8 +1448,8 @@
         </p:nvSpPr>
         <p:spPr>
           <a:xfrm>
-            <a:off x="399574" y="230708"/>
-            <a:ext cx="7192328" cy="960173"/>
+            <a:off x="422990" y="230709"/>
+            <a:ext cx="7613810" cy="960173"/>
           </a:xfrm>
         </p:spPr>
         <p:txBody>
@@ -1464,8 +1480,8 @@
         </p:nvSpPr>
         <p:spPr>
           <a:xfrm>
-            <a:off x="399574" y="1289566"/>
-            <a:ext cx="3530956" cy="537430"/>
+            <a:off x="422989" y="1289566"/>
+            <a:ext cx="3737876" cy="537430"/>
           </a:xfrm>
         </p:spPr>
         <p:txBody>
@@ -1529,8 +1545,8 @@
         </p:nvSpPr>
         <p:spPr>
           <a:xfrm>
-            <a:off x="399574" y="1826996"/>
-            <a:ext cx="3530956" cy="3319266"/>
+            <a:off x="422989" y="1826996"/>
+            <a:ext cx="3737876" cy="3319266"/>
           </a:xfrm>
         </p:spPr>
         <p:txBody>
@@ -1614,8 +1630,8 @@
         </p:nvSpPr>
         <p:spPr>
           <a:xfrm>
-            <a:off x="4059560" y="1289566"/>
-            <a:ext cx="3532343" cy="537430"/>
+            <a:off x="4297457" y="1289566"/>
+            <a:ext cx="3739344" cy="537430"/>
           </a:xfrm>
         </p:spPr>
         <p:txBody>
@@ -1679,8 +1695,8 @@
         </p:nvSpPr>
         <p:spPr>
           <a:xfrm>
-            <a:off x="4059560" y="1826996"/>
-            <a:ext cx="3532343" cy="3319266"/>
+            <a:off x="4297457" y="1826996"/>
+            <a:ext cx="3739344" cy="3319266"/>
           </a:xfrm>
         </p:spPr>
         <p:txBody>
@@ -1769,7 +1785,7 @@
           <a:p>
             <a:fld id="{7F37A421-E2BE-A744-A1A0-937201EFD21E}" type="datetimeFigureOut">
               <a:rPr lang="en-US" smtClean="0"/>
-              <a:t>12/02/18</a:t>
+              <a:t>2/19/18</a:t>
             </a:fld>
             <a:endParaRPr lang="en-US"/>
           </a:p>
@@ -1887,7 +1903,7 @@
           <a:p>
             <a:fld id="{7F37A421-E2BE-A744-A1A0-937201EFD21E}" type="datetimeFigureOut">
               <a:rPr lang="en-US" smtClean="0"/>
-              <a:t>12/02/18</a:t>
+              <a:t>2/19/18</a:t>
             </a:fld>
             <a:endParaRPr lang="en-US"/>
           </a:p>
@@ -1982,7 +1998,7 @@
           <a:p>
             <a:fld id="{7F37A421-E2BE-A744-A1A0-937201EFD21E}" type="datetimeFigureOut">
               <a:rPr lang="en-US" smtClean="0"/>
-              <a:t>12/02/18</a:t>
+              <a:t>2/19/18</a:t>
             </a:fld>
             <a:endParaRPr lang="en-US"/>
           </a:p>
@@ -2072,8 +2088,8 @@
         </p:nvSpPr>
         <p:spPr>
           <a:xfrm>
-            <a:off x="399574" y="229375"/>
-            <a:ext cx="2629140" cy="976175"/>
+            <a:off x="422990" y="229376"/>
+            <a:ext cx="2783212" cy="976175"/>
           </a:xfrm>
         </p:spPr>
         <p:txBody>
@@ -2104,8 +2120,8 @@
         </p:nvSpPr>
         <p:spPr>
           <a:xfrm>
-            <a:off x="3124445" y="229375"/>
-            <a:ext cx="4467457" cy="4916886"/>
+            <a:off x="3307543" y="229375"/>
+            <a:ext cx="4729257" cy="4916886"/>
           </a:xfrm>
         </p:spPr>
         <p:txBody>
@@ -2189,8 +2205,8 @@
         </p:nvSpPr>
         <p:spPr>
           <a:xfrm>
-            <a:off x="399574" y="1205551"/>
-            <a:ext cx="2629140" cy="3940711"/>
+            <a:off x="422990" y="1205552"/>
+            <a:ext cx="2783212" cy="3940711"/>
           </a:xfrm>
         </p:spPr>
         <p:txBody>
@@ -2259,7 +2275,7 @@
           <a:p>
             <a:fld id="{7F37A421-E2BE-A744-A1A0-937201EFD21E}" type="datetimeFigureOut">
               <a:rPr lang="en-US" smtClean="0"/>
-              <a:t>12/02/18</a:t>
+              <a:t>2/19/18</a:t>
             </a:fld>
             <a:endParaRPr lang="en-US"/>
           </a:p>
@@ -2349,8 +2365,8 @@
         </p:nvSpPr>
         <p:spPr>
           <a:xfrm>
-            <a:off x="1566386" y="4032727"/>
-            <a:ext cx="4794885" cy="476087"/>
+            <a:off x="1658179" y="4032728"/>
+            <a:ext cx="5075873" cy="476087"/>
           </a:xfrm>
         </p:spPr>
         <p:txBody>
@@ -2381,8 +2397,8 @@
         </p:nvSpPr>
         <p:spPr>
           <a:xfrm>
-            <a:off x="1566386" y="514759"/>
-            <a:ext cx="4794885" cy="3456623"/>
+            <a:off x="1658179" y="514760"/>
+            <a:ext cx="5075873" cy="3456623"/>
           </a:xfrm>
         </p:spPr>
         <p:txBody>
@@ -2442,8 +2458,8 @@
         </p:nvSpPr>
         <p:spPr>
           <a:xfrm>
-            <a:off x="1566386" y="4508814"/>
-            <a:ext cx="4794885" cy="676121"/>
+            <a:off x="1658179" y="4508815"/>
+            <a:ext cx="5075873" cy="676121"/>
           </a:xfrm>
         </p:spPr>
         <p:txBody>
@@ -2512,7 +2528,7 @@
           <a:p>
             <a:fld id="{7F37A421-E2BE-A744-A1A0-937201EFD21E}" type="datetimeFigureOut">
               <a:rPr lang="en-US" smtClean="0"/>
-              <a:t>12/02/18</a:t>
+              <a:t>2/19/18</a:t>
             </a:fld>
             <a:endParaRPr lang="en-US"/>
           </a:p>
@@ -2607,8 +2623,8 @@
         </p:nvSpPr>
         <p:spPr>
           <a:xfrm>
-            <a:off x="399574" y="230708"/>
-            <a:ext cx="7192328" cy="960173"/>
+            <a:off x="422990" y="230709"/>
+            <a:ext cx="7613810" cy="960173"/>
           </a:xfrm>
           <a:prstGeom prst="rect">
             <a:avLst/>
@@ -2640,8 +2656,8 @@
         </p:nvSpPr>
         <p:spPr>
           <a:xfrm>
-            <a:off x="399574" y="1344243"/>
-            <a:ext cx="7192328" cy="3802019"/>
+            <a:off x="422990" y="1344244"/>
+            <a:ext cx="7613810" cy="3802019"/>
           </a:xfrm>
           <a:prstGeom prst="rect">
             <a:avLst/>
@@ -2702,8 +2718,8 @@
         </p:nvSpPr>
         <p:spPr>
           <a:xfrm>
-            <a:off x="399574" y="5339630"/>
-            <a:ext cx="1864678" cy="306722"/>
+            <a:off x="422990" y="5339630"/>
+            <a:ext cx="1973951" cy="306722"/>
           </a:xfrm>
           <a:prstGeom prst="rect">
             <a:avLst/>
@@ -2725,7 +2741,7 @@
           <a:p>
             <a:fld id="{7F37A421-E2BE-A744-A1A0-937201EFD21E}" type="datetimeFigureOut">
               <a:rPr lang="en-US" smtClean="0"/>
-              <a:t>12/02/18</a:t>
+              <a:t>2/19/18</a:t>
             </a:fld>
             <a:endParaRPr lang="en-US"/>
           </a:p>
@@ -2743,8 +2759,8 @@
         </p:nvSpPr>
         <p:spPr>
           <a:xfrm>
-            <a:off x="2730421" y="5339630"/>
-            <a:ext cx="2530634" cy="306722"/>
+            <a:off x="2890428" y="5339630"/>
+            <a:ext cx="2678933" cy="306722"/>
           </a:xfrm>
           <a:prstGeom prst="rect">
             <a:avLst/>
@@ -2780,8 +2796,8 @@
         </p:nvSpPr>
         <p:spPr>
           <a:xfrm>
-            <a:off x="5727224" y="5339630"/>
-            <a:ext cx="1864678" cy="306722"/>
+            <a:off x="6062848" y="5339630"/>
+            <a:ext cx="1973951" cy="306722"/>
           </a:xfrm>
           <a:prstGeom prst="rect">
             <a:avLst/>
@@ -3102,1209 +3118,1136 @@
       </p:grpSpPr>
       <p:grpSp>
         <p:nvGrpSpPr>
-          <p:cNvPr id="49" name="Group 48"/>
+          <p:cNvPr id="52" name="Group 51"/>
           <p:cNvGrpSpPr/>
           <p:nvPr/>
         </p:nvGrpSpPr>
         <p:grpSpPr>
           <a:xfrm>
-            <a:off x="179987" y="-42807"/>
-            <a:ext cx="7706117" cy="5729962"/>
-            <a:chOff x="137177" y="0"/>
-            <a:chExt cx="7706117" cy="5729962"/>
+            <a:off x="467934" y="1481547"/>
+            <a:ext cx="1275288" cy="3394833"/>
+            <a:chOff x="1115645" y="941810"/>
+            <a:chExt cx="1319537" cy="3640201"/>
           </a:xfrm>
         </p:grpSpPr>
-        <p:grpSp>
-          <p:nvGrpSpPr>
-            <p:cNvPr id="50" name="Group 49"/>
-            <p:cNvGrpSpPr/>
+        <p:cxnSp>
+          <p:nvCxnSpPr>
+            <p:cNvPr id="82" name="Straight Connector 81"/>
+            <p:cNvCxnSpPr/>
             <p:nvPr/>
-          </p:nvGrpSpPr>
-          <p:grpSpPr>
+          </p:nvCxnSpPr>
+          <p:spPr>
             <a:xfrm>
-              <a:off x="137177" y="0"/>
-              <a:ext cx="7706117" cy="4919187"/>
-              <a:chOff x="230760" y="0"/>
-              <a:chExt cx="7706117" cy="4919187"/>
+              <a:off x="1115645" y="1819075"/>
+              <a:ext cx="0" cy="2762936"/>
             </a:xfrm>
-          </p:grpSpPr>
-          <p:grpSp>
-            <p:nvGrpSpPr>
-              <p:cNvPr id="52" name="Group 51"/>
-              <p:cNvGrpSpPr/>
-              <p:nvPr/>
-            </p:nvGrpSpPr>
-            <p:grpSpPr>
-              <a:xfrm>
-                <a:off x="230760" y="1524354"/>
-                <a:ext cx="1275288" cy="3394833"/>
-                <a:chOff x="1115645" y="941810"/>
-                <a:chExt cx="1319537" cy="3640201"/>
-              </a:xfrm>
-            </p:grpSpPr>
-            <p:cxnSp>
-              <p:nvCxnSpPr>
-                <p:cNvPr id="82" name="Straight Connector 81"/>
-                <p:cNvCxnSpPr/>
-                <p:nvPr/>
-              </p:nvCxnSpPr>
-              <p:spPr>
-                <a:xfrm>
-                  <a:off x="1115645" y="1819075"/>
-                  <a:ext cx="0" cy="2762936"/>
-                </a:xfrm>
-                <a:prstGeom prst="line">
-                  <a:avLst/>
-                </a:prstGeom>
-                <a:ln>
-                  <a:solidFill>
-                    <a:schemeClr val="tx1"/>
-                  </a:solidFill>
-                </a:ln>
-                <a:effectLst/>
-              </p:spPr>
-              <p:style>
-                <a:lnRef idx="2">
-                  <a:schemeClr val="accent1"/>
-                </a:lnRef>
-                <a:fillRef idx="0">
-                  <a:schemeClr val="accent1"/>
-                </a:fillRef>
-                <a:effectRef idx="1">
-                  <a:schemeClr val="accent1"/>
-                </a:effectRef>
-                <a:fontRef idx="minor">
-                  <a:schemeClr val="tx1"/>
-                </a:fontRef>
-              </p:style>
-            </p:cxnSp>
-            <p:cxnSp>
-              <p:nvCxnSpPr>
-                <p:cNvPr id="83" name="Straight Connector 82"/>
-                <p:cNvCxnSpPr/>
-                <p:nvPr/>
-              </p:nvCxnSpPr>
-              <p:spPr>
-                <a:xfrm>
-                  <a:off x="2435182" y="941810"/>
-                  <a:ext cx="0" cy="2762936"/>
-                </a:xfrm>
-                <a:prstGeom prst="line">
-                  <a:avLst/>
-                </a:prstGeom>
-                <a:ln>
-                  <a:solidFill>
-                    <a:schemeClr val="tx1"/>
-                  </a:solidFill>
-                </a:ln>
-                <a:effectLst/>
-              </p:spPr>
-              <p:style>
-                <a:lnRef idx="2">
-                  <a:schemeClr val="accent1"/>
-                </a:lnRef>
-                <a:fillRef idx="0">
-                  <a:schemeClr val="accent1"/>
-                </a:fillRef>
-                <a:effectRef idx="1">
-                  <a:schemeClr val="accent1"/>
-                </a:effectRef>
-                <a:fontRef idx="minor">
-                  <a:schemeClr val="tx1"/>
-                </a:fontRef>
-              </p:style>
-            </p:cxnSp>
-            <p:cxnSp>
-              <p:nvCxnSpPr>
-                <p:cNvPr id="84" name="Straight Connector 83"/>
-                <p:cNvCxnSpPr/>
-                <p:nvPr/>
-              </p:nvCxnSpPr>
-              <p:spPr>
-                <a:xfrm flipV="1">
-                  <a:off x="1115645" y="941810"/>
-                  <a:ext cx="1319537" cy="877265"/>
-                </a:xfrm>
-                <a:prstGeom prst="line">
-                  <a:avLst/>
-                </a:prstGeom>
-                <a:ln>
-                  <a:solidFill>
-                    <a:schemeClr val="tx1"/>
-                  </a:solidFill>
-                </a:ln>
-                <a:effectLst/>
-              </p:spPr>
-              <p:style>
-                <a:lnRef idx="2">
-                  <a:schemeClr val="accent1"/>
-                </a:lnRef>
-                <a:fillRef idx="0">
-                  <a:schemeClr val="accent1"/>
-                </a:fillRef>
-                <a:effectRef idx="1">
-                  <a:schemeClr val="accent1"/>
-                </a:effectRef>
-                <a:fontRef idx="minor">
-                  <a:schemeClr val="tx1"/>
-                </a:fontRef>
-              </p:style>
-            </p:cxnSp>
-            <p:cxnSp>
-              <p:nvCxnSpPr>
-                <p:cNvPr id="85" name="Straight Connector 84"/>
-                <p:cNvCxnSpPr/>
-                <p:nvPr/>
-              </p:nvCxnSpPr>
-              <p:spPr>
-                <a:xfrm flipV="1">
-                  <a:off x="1115645" y="3704746"/>
-                  <a:ext cx="1319537" cy="877265"/>
-                </a:xfrm>
-                <a:prstGeom prst="line">
-                  <a:avLst/>
-                </a:prstGeom>
-                <a:ln>
-                  <a:solidFill>
-                    <a:schemeClr val="tx1"/>
-                  </a:solidFill>
-                </a:ln>
-                <a:effectLst/>
-              </p:spPr>
-              <p:style>
-                <a:lnRef idx="2">
-                  <a:schemeClr val="accent1"/>
-                </a:lnRef>
-                <a:fillRef idx="0">
-                  <a:schemeClr val="accent1"/>
-                </a:fillRef>
-                <a:effectRef idx="1">
-                  <a:schemeClr val="accent1"/>
-                </a:effectRef>
-                <a:fontRef idx="minor">
-                  <a:schemeClr val="tx1"/>
-                </a:fontRef>
-              </p:style>
-            </p:cxnSp>
-          </p:grpSp>
-          <p:grpSp>
-            <p:nvGrpSpPr>
-              <p:cNvPr id="53" name="Group 52"/>
-              <p:cNvGrpSpPr/>
-              <p:nvPr/>
-            </p:nvGrpSpPr>
-            <p:grpSpPr>
-              <a:xfrm>
-                <a:off x="3297575" y="1524354"/>
-                <a:ext cx="1275288" cy="3394833"/>
-                <a:chOff x="1115645" y="941810"/>
-                <a:chExt cx="1319537" cy="3640201"/>
-              </a:xfrm>
-            </p:grpSpPr>
-            <p:cxnSp>
-              <p:nvCxnSpPr>
-                <p:cNvPr id="78" name="Straight Connector 77"/>
-                <p:cNvCxnSpPr/>
-                <p:nvPr/>
-              </p:nvCxnSpPr>
-              <p:spPr>
-                <a:xfrm>
-                  <a:off x="1115645" y="1819075"/>
-                  <a:ext cx="0" cy="2762936"/>
-                </a:xfrm>
-                <a:prstGeom prst="line">
-                  <a:avLst/>
-                </a:prstGeom>
-                <a:ln>
-                  <a:solidFill>
-                    <a:schemeClr val="tx1"/>
-                  </a:solidFill>
-                </a:ln>
-                <a:effectLst/>
-              </p:spPr>
-              <p:style>
-                <a:lnRef idx="2">
-                  <a:schemeClr val="accent1"/>
-                </a:lnRef>
-                <a:fillRef idx="0">
-                  <a:schemeClr val="accent1"/>
-                </a:fillRef>
-                <a:effectRef idx="1">
-                  <a:schemeClr val="accent1"/>
-                </a:effectRef>
-                <a:fontRef idx="minor">
-                  <a:schemeClr val="tx1"/>
-                </a:fontRef>
-              </p:style>
-            </p:cxnSp>
-            <p:cxnSp>
-              <p:nvCxnSpPr>
-                <p:cNvPr id="79" name="Straight Connector 78"/>
-                <p:cNvCxnSpPr/>
-                <p:nvPr/>
-              </p:nvCxnSpPr>
-              <p:spPr>
-                <a:xfrm>
-                  <a:off x="2435182" y="941810"/>
-                  <a:ext cx="0" cy="2762936"/>
-                </a:xfrm>
-                <a:prstGeom prst="line">
-                  <a:avLst/>
-                </a:prstGeom>
-                <a:ln>
-                  <a:solidFill>
-                    <a:schemeClr val="tx1"/>
-                  </a:solidFill>
-                </a:ln>
-                <a:effectLst/>
-              </p:spPr>
-              <p:style>
-                <a:lnRef idx="2">
-                  <a:schemeClr val="accent1"/>
-                </a:lnRef>
-                <a:fillRef idx="0">
-                  <a:schemeClr val="accent1"/>
-                </a:fillRef>
-                <a:effectRef idx="1">
-                  <a:schemeClr val="accent1"/>
-                </a:effectRef>
-                <a:fontRef idx="minor">
-                  <a:schemeClr val="tx1"/>
-                </a:fontRef>
-              </p:style>
-            </p:cxnSp>
-            <p:cxnSp>
-              <p:nvCxnSpPr>
-                <p:cNvPr id="80" name="Straight Connector 79"/>
-                <p:cNvCxnSpPr/>
-                <p:nvPr/>
-              </p:nvCxnSpPr>
-              <p:spPr>
-                <a:xfrm flipV="1">
-                  <a:off x="1115645" y="941810"/>
-                  <a:ext cx="1319537" cy="877265"/>
-                </a:xfrm>
-                <a:prstGeom prst="line">
-                  <a:avLst/>
-                </a:prstGeom>
-                <a:ln>
-                  <a:solidFill>
-                    <a:schemeClr val="tx1"/>
-                  </a:solidFill>
-                </a:ln>
-                <a:effectLst/>
-              </p:spPr>
-              <p:style>
-                <a:lnRef idx="2">
-                  <a:schemeClr val="accent1"/>
-                </a:lnRef>
-                <a:fillRef idx="0">
-                  <a:schemeClr val="accent1"/>
-                </a:fillRef>
-                <a:effectRef idx="1">
-                  <a:schemeClr val="accent1"/>
-                </a:effectRef>
-                <a:fontRef idx="minor">
-                  <a:schemeClr val="tx1"/>
-                </a:fontRef>
-              </p:style>
-            </p:cxnSp>
-            <p:cxnSp>
-              <p:nvCxnSpPr>
-                <p:cNvPr id="81" name="Straight Connector 80"/>
-                <p:cNvCxnSpPr/>
-                <p:nvPr/>
-              </p:nvCxnSpPr>
-              <p:spPr>
-                <a:xfrm flipV="1">
-                  <a:off x="1115645" y="3704746"/>
-                  <a:ext cx="1319537" cy="877265"/>
-                </a:xfrm>
-                <a:prstGeom prst="line">
-                  <a:avLst/>
-                </a:prstGeom>
-                <a:ln>
-                  <a:solidFill>
-                    <a:schemeClr val="tx1"/>
-                  </a:solidFill>
-                </a:ln>
-                <a:effectLst/>
-              </p:spPr>
-              <p:style>
-                <a:lnRef idx="2">
-                  <a:schemeClr val="accent1"/>
-                </a:lnRef>
-                <a:fillRef idx="0">
-                  <a:schemeClr val="accent1"/>
-                </a:fillRef>
-                <a:effectRef idx="1">
-                  <a:schemeClr val="accent1"/>
-                </a:effectRef>
-                <a:fontRef idx="minor">
-                  <a:schemeClr val="tx1"/>
-                </a:fontRef>
-              </p:style>
-            </p:cxnSp>
-          </p:grpSp>
-          <p:grpSp>
-            <p:nvGrpSpPr>
-              <p:cNvPr id="54" name="Group 53"/>
-              <p:cNvGrpSpPr/>
-              <p:nvPr/>
-            </p:nvGrpSpPr>
-            <p:grpSpPr>
-              <a:xfrm>
-                <a:off x="6364391" y="1524354"/>
-                <a:ext cx="1275288" cy="3394833"/>
-                <a:chOff x="1115645" y="941810"/>
-                <a:chExt cx="1319537" cy="3640201"/>
-              </a:xfrm>
-            </p:grpSpPr>
-            <p:cxnSp>
-              <p:nvCxnSpPr>
-                <p:cNvPr id="74" name="Straight Connector 73"/>
-                <p:cNvCxnSpPr/>
-                <p:nvPr/>
-              </p:nvCxnSpPr>
-              <p:spPr>
-                <a:xfrm>
-                  <a:off x="1115645" y="1819075"/>
-                  <a:ext cx="0" cy="2762936"/>
-                </a:xfrm>
-                <a:prstGeom prst="line">
-                  <a:avLst/>
-                </a:prstGeom>
-                <a:ln>
-                  <a:solidFill>
-                    <a:schemeClr val="tx1"/>
-                  </a:solidFill>
-                </a:ln>
-                <a:effectLst/>
-              </p:spPr>
-              <p:style>
-                <a:lnRef idx="2">
-                  <a:schemeClr val="accent1"/>
-                </a:lnRef>
-                <a:fillRef idx="0">
-                  <a:schemeClr val="accent1"/>
-                </a:fillRef>
-                <a:effectRef idx="1">
-                  <a:schemeClr val="accent1"/>
-                </a:effectRef>
-                <a:fontRef idx="minor">
-                  <a:schemeClr val="tx1"/>
-                </a:fontRef>
-              </p:style>
-            </p:cxnSp>
-            <p:cxnSp>
-              <p:nvCxnSpPr>
-                <p:cNvPr id="75" name="Straight Connector 74"/>
-                <p:cNvCxnSpPr/>
-                <p:nvPr/>
-              </p:nvCxnSpPr>
-              <p:spPr>
-                <a:xfrm>
-                  <a:off x="2435182" y="941810"/>
-                  <a:ext cx="0" cy="2762936"/>
-                </a:xfrm>
-                <a:prstGeom prst="line">
-                  <a:avLst/>
-                </a:prstGeom>
-                <a:ln>
-                  <a:solidFill>
-                    <a:schemeClr val="tx1"/>
-                  </a:solidFill>
-                </a:ln>
-                <a:effectLst/>
-              </p:spPr>
-              <p:style>
-                <a:lnRef idx="2">
-                  <a:schemeClr val="accent1"/>
-                </a:lnRef>
-                <a:fillRef idx="0">
-                  <a:schemeClr val="accent1"/>
-                </a:fillRef>
-                <a:effectRef idx="1">
-                  <a:schemeClr val="accent1"/>
-                </a:effectRef>
-                <a:fontRef idx="minor">
-                  <a:schemeClr val="tx1"/>
-                </a:fontRef>
-              </p:style>
-            </p:cxnSp>
-            <p:cxnSp>
-              <p:nvCxnSpPr>
-                <p:cNvPr id="76" name="Straight Connector 75"/>
-                <p:cNvCxnSpPr/>
-                <p:nvPr/>
-              </p:nvCxnSpPr>
-              <p:spPr>
-                <a:xfrm flipV="1">
-                  <a:off x="1115645" y="941810"/>
-                  <a:ext cx="1319537" cy="877265"/>
-                </a:xfrm>
-                <a:prstGeom prst="line">
-                  <a:avLst/>
-                </a:prstGeom>
-                <a:ln>
-                  <a:solidFill>
-                    <a:schemeClr val="tx1"/>
-                  </a:solidFill>
-                </a:ln>
-                <a:effectLst/>
-              </p:spPr>
-              <p:style>
-                <a:lnRef idx="2">
-                  <a:schemeClr val="accent1"/>
-                </a:lnRef>
-                <a:fillRef idx="0">
-                  <a:schemeClr val="accent1"/>
-                </a:fillRef>
-                <a:effectRef idx="1">
-                  <a:schemeClr val="accent1"/>
-                </a:effectRef>
-                <a:fontRef idx="minor">
-                  <a:schemeClr val="tx1"/>
-                </a:fontRef>
-              </p:style>
-            </p:cxnSp>
-            <p:cxnSp>
-              <p:nvCxnSpPr>
-                <p:cNvPr id="77" name="Straight Connector 76"/>
-                <p:cNvCxnSpPr/>
-                <p:nvPr/>
-              </p:nvCxnSpPr>
-              <p:spPr>
-                <a:xfrm flipV="1">
-                  <a:off x="1115645" y="3704746"/>
-                  <a:ext cx="1319537" cy="877265"/>
-                </a:xfrm>
-                <a:prstGeom prst="line">
-                  <a:avLst/>
-                </a:prstGeom>
-                <a:ln>
-                  <a:solidFill>
-                    <a:schemeClr val="tx1"/>
-                  </a:solidFill>
-                </a:ln>
-                <a:effectLst/>
-              </p:spPr>
-              <p:style>
-                <a:lnRef idx="2">
-                  <a:schemeClr val="accent1"/>
-                </a:lnRef>
-                <a:fillRef idx="0">
-                  <a:schemeClr val="accent1"/>
-                </a:fillRef>
-                <a:effectRef idx="1">
-                  <a:schemeClr val="accent1"/>
-                </a:effectRef>
-                <a:fontRef idx="minor">
-                  <a:schemeClr val="tx1"/>
-                </a:fontRef>
-              </p:style>
-            </p:cxnSp>
-          </p:grpSp>
-          <p:sp>
-            <p:nvSpPr>
-              <p:cNvPr id="55" name="Oval 54"/>
-              <p:cNvSpPr>
-                <a:spLocks noChangeAspect="1"/>
-              </p:cNvSpPr>
-              <p:nvPr/>
-            </p:nvSpPr>
-            <p:spPr>
-              <a:xfrm>
-                <a:off x="3825387" y="3120092"/>
-                <a:ext cx="189728" cy="359999"/>
-              </a:xfrm>
-              <a:prstGeom prst="ellipse">
-                <a:avLst/>
-              </a:prstGeom>
+            <a:prstGeom prst="line">
+              <a:avLst/>
+            </a:prstGeom>
+            <a:ln>
               <a:solidFill>
                 <a:schemeClr val="tx1"/>
               </a:solidFill>
-              <a:ln>
-                <a:solidFill>
-                  <a:srgbClr val="000000"/>
-                </a:solidFill>
-              </a:ln>
-              <a:effectLst/>
-            </p:spPr>
-            <p:style>
-              <a:lnRef idx="1">
-                <a:schemeClr val="accent1"/>
-              </a:lnRef>
-              <a:fillRef idx="3">
-                <a:schemeClr val="accent1"/>
-              </a:fillRef>
-              <a:effectRef idx="2">
-                <a:schemeClr val="accent1"/>
-              </a:effectRef>
-              <a:fontRef idx="minor">
-                <a:schemeClr val="lt1"/>
-              </a:fontRef>
-            </p:style>
-            <p:txBody>
-              <a:bodyPr rtlCol="0" anchor="ctr"/>
-              <a:lstStyle/>
-              <a:p>
-                <a:pPr algn="ctr"/>
-                <a:endParaRPr lang="en-US"/>
-              </a:p>
-            </p:txBody>
-          </p:sp>
-          <p:cxnSp>
-            <p:nvCxnSpPr>
-              <p:cNvPr id="56" name="Straight Connector 55"/>
-              <p:cNvCxnSpPr>
-                <a:endCxn id="58" idx="0"/>
-              </p:cNvCxnSpPr>
-              <p:nvPr/>
-            </p:nvCxnSpPr>
-            <p:spPr>
-              <a:xfrm flipV="1">
-                <a:off x="901583" y="2858903"/>
-                <a:ext cx="6137640" cy="492314"/>
-              </a:xfrm>
-              <a:prstGeom prst="line">
-                <a:avLst/>
-              </a:prstGeom>
-              <a:ln>
-                <a:solidFill>
-                  <a:srgbClr val="000000"/>
-                </a:solidFill>
-                <a:prstDash val="dash"/>
-                <a:headEnd type="none"/>
-                <a:tailEnd type="arrow"/>
-              </a:ln>
-              <a:effectLst/>
-            </p:spPr>
-            <p:style>
-              <a:lnRef idx="2">
-                <a:schemeClr val="accent1"/>
-              </a:lnRef>
-              <a:fillRef idx="0">
-                <a:schemeClr val="accent1"/>
-              </a:fillRef>
-              <a:effectRef idx="1">
-                <a:schemeClr val="accent1"/>
-              </a:effectRef>
-              <a:fontRef idx="minor">
-                <a:schemeClr val="tx1"/>
-              </a:fontRef>
-            </p:style>
-          </p:cxnSp>
-          <p:cxnSp>
-            <p:nvCxnSpPr>
-              <p:cNvPr id="57" name="Straight Connector 56"/>
-              <p:cNvCxnSpPr>
-                <a:endCxn id="58" idx="4"/>
-              </p:cNvCxnSpPr>
-              <p:nvPr/>
-            </p:nvCxnSpPr>
-            <p:spPr>
-              <a:xfrm>
-                <a:off x="901583" y="3351216"/>
-                <a:ext cx="6137640" cy="227686"/>
-              </a:xfrm>
-              <a:prstGeom prst="line">
-                <a:avLst/>
-              </a:prstGeom>
-              <a:ln>
-                <a:solidFill>
-                  <a:srgbClr val="000000"/>
-                </a:solidFill>
-                <a:prstDash val="dash"/>
-                <a:headEnd type="none"/>
-                <a:tailEnd type="arrow"/>
-              </a:ln>
-              <a:effectLst/>
-            </p:spPr>
-            <p:style>
-              <a:lnRef idx="2">
-                <a:schemeClr val="accent1"/>
-              </a:lnRef>
-              <a:fillRef idx="0">
-                <a:schemeClr val="accent1"/>
-              </a:fillRef>
-              <a:effectRef idx="1">
-                <a:schemeClr val="accent1"/>
-              </a:effectRef>
-              <a:fontRef idx="minor">
-                <a:schemeClr val="tx1"/>
-              </a:fontRef>
-            </p:style>
-          </p:cxnSp>
-          <p:sp>
-            <p:nvSpPr>
-              <p:cNvPr id="58" name="Oval 57"/>
-              <p:cNvSpPr>
-                <a:spLocks noChangeAspect="1"/>
-              </p:cNvSpPr>
-              <p:nvPr/>
-            </p:nvSpPr>
-            <p:spPr>
-              <a:xfrm>
-                <a:off x="6849493" y="2858903"/>
-                <a:ext cx="379457" cy="720000"/>
-              </a:xfrm>
-              <a:prstGeom prst="ellipse">
-                <a:avLst/>
-              </a:prstGeom>
-              <a:solidFill>
-                <a:srgbClr val="FFFFFF"/>
-              </a:solidFill>
-              <a:ln w="28575" cmpd="sng">
-                <a:solidFill>
-                  <a:srgbClr val="000000"/>
-                </a:solidFill>
-                <a:prstDash val="dash"/>
-              </a:ln>
-              <a:effectLst/>
-            </p:spPr>
-            <p:style>
-              <a:lnRef idx="1">
-                <a:schemeClr val="accent1"/>
-              </a:lnRef>
-              <a:fillRef idx="3">
-                <a:schemeClr val="accent1"/>
-              </a:fillRef>
-              <a:effectRef idx="2">
-                <a:schemeClr val="accent1"/>
-              </a:effectRef>
-              <a:fontRef idx="minor">
-                <a:schemeClr val="lt1"/>
-              </a:fontRef>
-            </p:style>
-            <p:txBody>
-              <a:bodyPr rtlCol="0" anchor="ctr"/>
-              <a:lstStyle/>
-              <a:p>
-                <a:pPr algn="ctr"/>
-                <a:endParaRPr lang="en-US"/>
-              </a:p>
-            </p:txBody>
-          </p:sp>
-          <p:sp>
-            <p:nvSpPr>
-              <p:cNvPr id="59" name="TextBox 58"/>
-              <p:cNvSpPr txBox="1"/>
-              <p:nvPr/>
-            </p:nvSpPr>
-            <p:spPr>
-              <a:xfrm>
-                <a:off x="3121373" y="396000"/>
-                <a:ext cx="1450807" cy="923330"/>
-              </a:xfrm>
-              <a:prstGeom prst="rect">
-                <a:avLst/>
-              </a:prstGeom>
-              <a:noFill/>
-            </p:spPr>
-            <p:txBody>
-              <a:bodyPr wrap="none" rtlCol="0" anchor="b">
-                <a:spAutoFit/>
-              </a:bodyPr>
-              <a:lstStyle/>
-              <a:p>
-                <a:pPr algn="ctr"/>
-                <a:r>
-                  <a:rPr lang="en-US" sz="2700" dirty="0"/>
-                  <a:t>Finite </a:t>
-                </a:r>
-              </a:p>
-              <a:p>
-                <a:pPr algn="ctr"/>
-                <a:r>
-                  <a:rPr lang="en-US" sz="2700" dirty="0"/>
-                  <a:t>Aperture</a:t>
-                </a:r>
-              </a:p>
-            </p:txBody>
-          </p:sp>
-          <p:grpSp>
-            <p:nvGrpSpPr>
-              <p:cNvPr id="60" name="Group 59"/>
-              <p:cNvGrpSpPr/>
-              <p:nvPr/>
-            </p:nvGrpSpPr>
-            <p:grpSpPr>
-              <a:xfrm>
-                <a:off x="299883" y="415499"/>
-                <a:ext cx="1147670" cy="903831"/>
-                <a:chOff x="446942" y="415499"/>
-                <a:chExt cx="1147670" cy="903831"/>
-              </a:xfrm>
-            </p:grpSpPr>
-            <p:sp>
-              <p:nvSpPr>
-                <p:cNvPr id="72" name="TextBox 71"/>
-                <p:cNvSpPr txBox="1"/>
-                <p:nvPr/>
-              </p:nvSpPr>
-              <p:spPr>
-                <a:xfrm>
-                  <a:off x="446942" y="415499"/>
-                  <a:ext cx="1147670" cy="507831"/>
-                </a:xfrm>
-                <a:prstGeom prst="rect">
-                  <a:avLst/>
-                </a:prstGeom>
-                <a:noFill/>
-              </p:spPr>
-              <p:txBody>
-                <a:bodyPr wrap="none" rtlCol="0">
-                  <a:spAutoFit/>
-                </a:bodyPr>
-                <a:lstStyle/>
-                <a:p>
-                  <a:pPr algn="ctr"/>
-                  <a:r>
-                    <a:rPr lang="en-US" sz="2700" dirty="0" smtClean="0"/>
-                    <a:t>Source</a:t>
-                  </a:r>
-                  <a:endParaRPr lang="en-US" sz="2700" dirty="0"/>
-                </a:p>
-              </p:txBody>
-            </p:sp>
-            <p:pic>
-              <p:nvPicPr>
-                <p:cNvPr id="73" name="Picture 72" descr="latex-image-1.pdf"/>
-                <p:cNvPicPr>
-                  <a:picLocks noChangeAspect="1"/>
-                </p:cNvPicPr>
-                <p:nvPr/>
-              </p:nvPicPr>
-              <p:blipFill>
-                <a:blip r:embed="rId2">
-                  <a:extLst>
-                    <a:ext uri="{28A0092B-C50C-407E-A947-70E740481C1C}">
-                      <a14:useLocalDpi xmlns:a14="http://schemas.microsoft.com/office/drawing/2010/main" val="0"/>
-                    </a:ext>
-                  </a:extLst>
-                </a:blip>
-                <a:stretch>
-                  <a:fillRect/>
-                </a:stretch>
-              </p:blipFill>
-              <p:spPr>
-                <a:xfrm>
-                  <a:off x="453534" y="923330"/>
-                  <a:ext cx="1134486" cy="396000"/>
-                </a:xfrm>
-                <a:prstGeom prst="rect">
-                  <a:avLst/>
-                </a:prstGeom>
-              </p:spPr>
-            </p:pic>
-          </p:grpSp>
-          <p:grpSp>
-            <p:nvGrpSpPr>
-              <p:cNvPr id="61" name="Group 60"/>
-              <p:cNvGrpSpPr/>
-              <p:nvPr/>
-            </p:nvGrpSpPr>
-            <p:grpSpPr>
-              <a:xfrm>
-                <a:off x="6398325" y="0"/>
-                <a:ext cx="1538552" cy="1319330"/>
-                <a:chOff x="6398325" y="0"/>
-                <a:chExt cx="1538552" cy="1319330"/>
-              </a:xfrm>
-            </p:grpSpPr>
-            <p:sp>
-              <p:nvSpPr>
-                <p:cNvPr id="70" name="TextBox 69"/>
-                <p:cNvSpPr txBox="1"/>
-                <p:nvPr/>
-              </p:nvSpPr>
-              <p:spPr>
-                <a:xfrm>
-                  <a:off x="6398325" y="0"/>
-                  <a:ext cx="1538552" cy="923330"/>
-                </a:xfrm>
-                <a:prstGeom prst="rect">
-                  <a:avLst/>
-                </a:prstGeom>
-                <a:noFill/>
-              </p:spPr>
-              <p:txBody>
-                <a:bodyPr wrap="none" rtlCol="0" anchor="b">
-                  <a:spAutoFit/>
-                </a:bodyPr>
-                <a:lstStyle/>
-                <a:p>
-                  <a:pPr algn="ctr"/>
-                  <a:r>
-                    <a:rPr lang="en-US" sz="2700" dirty="0"/>
-                    <a:t>Projected</a:t>
-                  </a:r>
-                </a:p>
-                <a:p>
-                  <a:pPr algn="ctr"/>
-                  <a:r>
-                    <a:rPr lang="en-US" sz="2700" dirty="0"/>
-                    <a:t>Image</a:t>
-                  </a:r>
-                </a:p>
-              </p:txBody>
-            </p:sp>
-            <p:pic>
-              <p:nvPicPr>
-                <p:cNvPr id="71" name="Picture 70" descr="latex-image-1.pdf"/>
-                <p:cNvPicPr>
-                  <a:picLocks noChangeAspect="1"/>
-                </p:cNvPicPr>
-                <p:nvPr/>
-              </p:nvPicPr>
-              <p:blipFill>
-                <a:blip r:embed="rId3">
-                  <a:extLst>
-                    <a:ext uri="{28A0092B-C50C-407E-A947-70E740481C1C}">
-                      <a14:useLocalDpi xmlns:a14="http://schemas.microsoft.com/office/drawing/2010/main" val="0"/>
-                    </a:ext>
-                  </a:extLst>
-                </a:blip>
-                <a:stretch>
-                  <a:fillRect/>
-                </a:stretch>
-              </p:blipFill>
-              <p:spPr>
-                <a:xfrm>
-                  <a:off x="6643169" y="923330"/>
-                  <a:ext cx="1048865" cy="396000"/>
-                </a:xfrm>
-                <a:prstGeom prst="rect">
-                  <a:avLst/>
-                </a:prstGeom>
-              </p:spPr>
-            </p:pic>
-          </p:grpSp>
-          <p:cxnSp>
-            <p:nvCxnSpPr>
-              <p:cNvPr id="62" name="Straight Arrow Connector 61"/>
-              <p:cNvCxnSpPr/>
-              <p:nvPr/>
-            </p:nvCxnSpPr>
-            <p:spPr>
-              <a:xfrm>
-                <a:off x="1042802" y="1926949"/>
-                <a:ext cx="2782585" cy="0"/>
-              </a:xfrm>
-              <a:prstGeom prst="straightConnector1">
-                <a:avLst/>
-              </a:prstGeom>
-              <a:ln>
-                <a:solidFill>
-                  <a:srgbClr val="000000"/>
-                </a:solidFill>
-                <a:headEnd type="arrow"/>
-                <a:tailEnd type="arrow"/>
-              </a:ln>
-              <a:effectLst/>
-            </p:spPr>
-            <p:style>
-              <a:lnRef idx="2">
-                <a:schemeClr val="accent1"/>
-              </a:lnRef>
-              <a:fillRef idx="0">
-                <a:schemeClr val="accent1"/>
-              </a:fillRef>
-              <a:effectRef idx="1">
-                <a:schemeClr val="accent1"/>
-              </a:effectRef>
-              <a:fontRef idx="minor">
-                <a:schemeClr val="tx1"/>
-              </a:fontRef>
-            </p:style>
-          </p:cxnSp>
-          <p:sp>
-            <p:nvSpPr>
-              <p:cNvPr id="63" name="TextBox 62"/>
-              <p:cNvSpPr txBox="1"/>
-              <p:nvPr/>
-            </p:nvSpPr>
-            <p:spPr>
-              <a:xfrm>
-                <a:off x="2251040" y="1523436"/>
-                <a:ext cx="406081" cy="400110"/>
-              </a:xfrm>
-              <a:prstGeom prst="rect">
-                <a:avLst/>
-              </a:prstGeom>
-              <a:noFill/>
-            </p:spPr>
-            <p:txBody>
-              <a:bodyPr wrap="none" rtlCol="0">
-                <a:spAutoFit/>
-              </a:bodyPr>
-              <a:lstStyle/>
-              <a:p>
-                <a:r>
-                  <a:rPr lang="en-US" sz="2000" dirty="0" smtClean="0"/>
-                  <a:t>d</a:t>
-                </a:r>
-                <a:r>
-                  <a:rPr lang="en-US" sz="2000" baseline="-25000" dirty="0" smtClean="0"/>
-                  <a:t>1</a:t>
-                </a:r>
-                <a:endParaRPr lang="en-US" sz="2000" baseline="-25000" dirty="0"/>
-              </a:p>
-            </p:txBody>
-          </p:sp>
-          <p:cxnSp>
-            <p:nvCxnSpPr>
-              <p:cNvPr id="64" name="Straight Arrow Connector 63"/>
-              <p:cNvCxnSpPr/>
-              <p:nvPr/>
-            </p:nvCxnSpPr>
-            <p:spPr>
-              <a:xfrm>
-                <a:off x="4131101" y="1923546"/>
-                <a:ext cx="2718392" cy="0"/>
-              </a:xfrm>
-              <a:prstGeom prst="straightConnector1">
-                <a:avLst/>
-              </a:prstGeom>
-              <a:ln>
-                <a:solidFill>
-                  <a:srgbClr val="000000"/>
-                </a:solidFill>
-                <a:headEnd type="arrow"/>
-                <a:tailEnd type="arrow"/>
-              </a:ln>
-              <a:effectLst/>
-            </p:spPr>
-            <p:style>
-              <a:lnRef idx="2">
-                <a:schemeClr val="accent1"/>
-              </a:lnRef>
-              <a:fillRef idx="0">
-                <a:schemeClr val="accent1"/>
-              </a:fillRef>
-              <a:effectRef idx="1">
-                <a:schemeClr val="accent1"/>
-              </a:effectRef>
-              <a:fontRef idx="minor">
-                <a:schemeClr val="tx1"/>
-              </a:fontRef>
-            </p:style>
-          </p:cxnSp>
-          <p:sp>
-            <p:nvSpPr>
-              <p:cNvPr id="65" name="TextBox 64"/>
-              <p:cNvSpPr txBox="1"/>
-              <p:nvPr/>
-            </p:nvSpPr>
-            <p:spPr>
-              <a:xfrm>
-                <a:off x="5364572" y="1520033"/>
-                <a:ext cx="406081" cy="400110"/>
-              </a:xfrm>
-              <a:prstGeom prst="rect">
-                <a:avLst/>
-              </a:prstGeom>
-              <a:noFill/>
-            </p:spPr>
-            <p:txBody>
-              <a:bodyPr wrap="none" rtlCol="0">
-                <a:spAutoFit/>
-              </a:bodyPr>
-              <a:lstStyle/>
-              <a:p>
-                <a:r>
-                  <a:rPr lang="en-US" sz="2000" dirty="0" smtClean="0"/>
-                  <a:t>d</a:t>
-                </a:r>
-                <a:r>
-                  <a:rPr lang="en-US" sz="2000" baseline="-25000" dirty="0" smtClean="0"/>
-                  <a:t>2</a:t>
-                </a:r>
-                <a:endParaRPr lang="en-US" sz="2000" baseline="-25000" dirty="0"/>
-              </a:p>
-            </p:txBody>
-          </p:sp>
-          <p:sp>
-            <p:nvSpPr>
-              <p:cNvPr id="66" name="Right Brace 65"/>
-              <p:cNvSpPr/>
-              <p:nvPr/>
-            </p:nvSpPr>
-            <p:spPr>
-              <a:xfrm rot="16200000">
-                <a:off x="3866369" y="2678903"/>
-                <a:ext cx="169465" cy="359999"/>
-              </a:xfrm>
-              <a:prstGeom prst="rightBrace">
-                <a:avLst/>
-              </a:prstGeom>
-              <a:ln>
-                <a:solidFill>
-                  <a:srgbClr val="000000"/>
-                </a:solidFill>
-              </a:ln>
-              <a:effectLst/>
-            </p:spPr>
-            <p:style>
-              <a:lnRef idx="2">
-                <a:schemeClr val="accent1"/>
-              </a:lnRef>
-              <a:fillRef idx="0">
-                <a:schemeClr val="accent1"/>
-              </a:fillRef>
-              <a:effectRef idx="1">
-                <a:schemeClr val="accent1"/>
-              </a:effectRef>
-              <a:fontRef idx="minor">
-                <a:schemeClr val="tx1"/>
-              </a:fontRef>
-            </p:style>
-            <p:txBody>
-              <a:bodyPr rtlCol="0" anchor="ctr"/>
-              <a:lstStyle/>
-              <a:p>
-                <a:pPr algn="ctr"/>
-                <a:endParaRPr lang="en-US"/>
-              </a:p>
-            </p:txBody>
-          </p:sp>
-          <p:sp>
-            <p:nvSpPr>
-              <p:cNvPr id="67" name="TextBox 66"/>
-              <p:cNvSpPr txBox="1"/>
-              <p:nvPr/>
-            </p:nvSpPr>
-            <p:spPr>
-              <a:xfrm>
-                <a:off x="3763084" y="2372094"/>
-                <a:ext cx="404077" cy="400110"/>
-              </a:xfrm>
-              <a:prstGeom prst="rect">
-                <a:avLst/>
-              </a:prstGeom>
-              <a:noFill/>
-            </p:spPr>
-            <p:txBody>
-              <a:bodyPr wrap="none" rtlCol="0">
-                <a:spAutoFit/>
-              </a:bodyPr>
-              <a:lstStyle/>
-              <a:p>
-                <a:r>
-                  <a:rPr lang="en-US" sz="2000" dirty="0" smtClean="0"/>
-                  <a:t>2r</a:t>
-                </a:r>
-                <a:endParaRPr lang="en-US" sz="2000" baseline="-25000" dirty="0"/>
-              </a:p>
-            </p:txBody>
-          </p:sp>
-          <p:sp>
-            <p:nvSpPr>
-              <p:cNvPr id="68" name="Right Brace 67"/>
-              <p:cNvSpPr/>
-              <p:nvPr/>
-            </p:nvSpPr>
-            <p:spPr>
-              <a:xfrm rot="16200000">
-                <a:off x="6952778" y="2478848"/>
-                <a:ext cx="169465" cy="359999"/>
-              </a:xfrm>
-              <a:prstGeom prst="rightBrace">
-                <a:avLst/>
-              </a:prstGeom>
-              <a:ln>
-                <a:solidFill>
-                  <a:srgbClr val="000000"/>
-                </a:solidFill>
-              </a:ln>
-              <a:effectLst/>
-            </p:spPr>
-            <p:style>
-              <a:lnRef idx="2">
-                <a:schemeClr val="accent1"/>
-              </a:lnRef>
-              <a:fillRef idx="0">
-                <a:schemeClr val="accent1"/>
-              </a:fillRef>
-              <a:effectRef idx="1">
-                <a:schemeClr val="accent1"/>
-              </a:effectRef>
-              <a:fontRef idx="minor">
-                <a:schemeClr val="tx1"/>
-              </a:fontRef>
-            </p:style>
-            <p:txBody>
-              <a:bodyPr rtlCol="0" anchor="ctr"/>
-              <a:lstStyle/>
-              <a:p>
-                <a:pPr algn="ctr"/>
-                <a:endParaRPr lang="en-US"/>
-              </a:p>
-            </p:txBody>
-          </p:sp>
-          <p:sp>
-            <p:nvSpPr>
-              <p:cNvPr id="69" name="TextBox 68"/>
-              <p:cNvSpPr txBox="1"/>
-              <p:nvPr/>
-            </p:nvSpPr>
-            <p:spPr>
-              <a:xfrm>
-                <a:off x="6822755" y="2172039"/>
-                <a:ext cx="453970" cy="400110"/>
-              </a:xfrm>
-              <a:prstGeom prst="rect">
-                <a:avLst/>
-              </a:prstGeom>
-              <a:noFill/>
-            </p:spPr>
-            <p:txBody>
-              <a:bodyPr wrap="none" rtlCol="0">
-                <a:spAutoFit/>
-              </a:bodyPr>
-              <a:lstStyle/>
-              <a:p>
-                <a:r>
-                  <a:rPr lang="en-US" sz="2000" dirty="0" smtClean="0"/>
-                  <a:t>2R</a:t>
-                </a:r>
-                <a:endParaRPr lang="en-US" sz="2000" baseline="-25000" dirty="0"/>
-              </a:p>
-            </p:txBody>
-          </p:sp>
-        </p:grpSp>
-        <p:pic>
-          <p:nvPicPr>
-            <p:cNvPr id="51" name="Picture 50" descr="latex-image-1.pdf"/>
-            <p:cNvPicPr>
-              <a:picLocks noChangeAspect="1"/>
-            </p:cNvPicPr>
+            </a:ln>
+            <a:effectLst/>
+          </p:spPr>
+          <p:style>
+            <a:lnRef idx="2">
+              <a:schemeClr val="accent1"/>
+            </a:lnRef>
+            <a:fillRef idx="0">
+              <a:schemeClr val="accent1"/>
+            </a:fillRef>
+            <a:effectRef idx="1">
+              <a:schemeClr val="accent1"/>
+            </a:effectRef>
+            <a:fontRef idx="minor">
+              <a:schemeClr val="tx1"/>
+            </a:fontRef>
+          </p:style>
+        </p:cxnSp>
+        <p:cxnSp>
+          <p:nvCxnSpPr>
+            <p:cNvPr id="83" name="Straight Connector 82"/>
+            <p:cNvCxnSpPr/>
             <p:nvPr/>
-          </p:nvPicPr>
-          <p:blipFill>
-            <a:blip r:embed="rId4">
-              <a:extLst>
-                <a:ext uri="{28A0092B-C50C-407E-A947-70E740481C1C}">
-                  <a14:useLocalDpi xmlns:a14="http://schemas.microsoft.com/office/drawing/2010/main" val="0"/>
-                </a:ext>
-              </a:extLst>
-            </a:blip>
-            <a:stretch>
-              <a:fillRect/>
-            </a:stretch>
-          </p:blipFill>
+          </p:nvCxnSpPr>
           <p:spPr>
             <a:xfrm>
-              <a:off x="3731804" y="4919187"/>
-              <a:ext cx="2381653" cy="810775"/>
+              <a:off x="2435182" y="941810"/>
+              <a:ext cx="0" cy="2762936"/>
             </a:xfrm>
-            <a:prstGeom prst="rect">
+            <a:prstGeom prst="line">
               <a:avLst/>
             </a:prstGeom>
+            <a:ln>
+              <a:solidFill>
+                <a:schemeClr val="tx1"/>
+              </a:solidFill>
+            </a:ln>
+            <a:effectLst/>
           </p:spPr>
-        </p:pic>
+          <p:style>
+            <a:lnRef idx="2">
+              <a:schemeClr val="accent1"/>
+            </a:lnRef>
+            <a:fillRef idx="0">
+              <a:schemeClr val="accent1"/>
+            </a:fillRef>
+            <a:effectRef idx="1">
+              <a:schemeClr val="accent1"/>
+            </a:effectRef>
+            <a:fontRef idx="minor">
+              <a:schemeClr val="tx1"/>
+            </a:fontRef>
+          </p:style>
+        </p:cxnSp>
+        <p:cxnSp>
+          <p:nvCxnSpPr>
+            <p:cNvPr id="84" name="Straight Connector 83"/>
+            <p:cNvCxnSpPr/>
+            <p:nvPr/>
+          </p:nvCxnSpPr>
+          <p:spPr>
+            <a:xfrm flipV="1">
+              <a:off x="1115645" y="941810"/>
+              <a:ext cx="1319537" cy="877265"/>
+            </a:xfrm>
+            <a:prstGeom prst="line">
+              <a:avLst/>
+            </a:prstGeom>
+            <a:ln>
+              <a:solidFill>
+                <a:schemeClr val="tx1"/>
+              </a:solidFill>
+            </a:ln>
+            <a:effectLst/>
+          </p:spPr>
+          <p:style>
+            <a:lnRef idx="2">
+              <a:schemeClr val="accent1"/>
+            </a:lnRef>
+            <a:fillRef idx="0">
+              <a:schemeClr val="accent1"/>
+            </a:fillRef>
+            <a:effectRef idx="1">
+              <a:schemeClr val="accent1"/>
+            </a:effectRef>
+            <a:fontRef idx="minor">
+              <a:schemeClr val="tx1"/>
+            </a:fontRef>
+          </p:style>
+        </p:cxnSp>
+        <p:cxnSp>
+          <p:nvCxnSpPr>
+            <p:cNvPr id="85" name="Straight Connector 84"/>
+            <p:cNvCxnSpPr/>
+            <p:nvPr/>
+          </p:nvCxnSpPr>
+          <p:spPr>
+            <a:xfrm flipV="1">
+              <a:off x="1115645" y="3704746"/>
+              <a:ext cx="1319537" cy="877265"/>
+            </a:xfrm>
+            <a:prstGeom prst="line">
+              <a:avLst/>
+            </a:prstGeom>
+            <a:ln>
+              <a:solidFill>
+                <a:schemeClr val="tx1"/>
+              </a:solidFill>
+            </a:ln>
+            <a:effectLst/>
+          </p:spPr>
+          <p:style>
+            <a:lnRef idx="2">
+              <a:schemeClr val="accent1"/>
+            </a:lnRef>
+            <a:fillRef idx="0">
+              <a:schemeClr val="accent1"/>
+            </a:fillRef>
+            <a:effectRef idx="1">
+              <a:schemeClr val="accent1"/>
+            </a:effectRef>
+            <a:fontRef idx="minor">
+              <a:schemeClr val="tx1"/>
+            </a:fontRef>
+          </p:style>
+        </p:cxnSp>
       </p:grpSp>
+      <p:grpSp>
+        <p:nvGrpSpPr>
+          <p:cNvPr id="53" name="Group 52"/>
+          <p:cNvGrpSpPr/>
+          <p:nvPr/>
+        </p:nvGrpSpPr>
+        <p:grpSpPr>
+          <a:xfrm>
+            <a:off x="3534749" y="1481547"/>
+            <a:ext cx="1275288" cy="3394833"/>
+            <a:chOff x="1115645" y="941810"/>
+            <a:chExt cx="1319537" cy="3640201"/>
+          </a:xfrm>
+        </p:grpSpPr>
+        <p:cxnSp>
+          <p:nvCxnSpPr>
+            <p:cNvPr id="78" name="Straight Connector 77"/>
+            <p:cNvCxnSpPr/>
+            <p:nvPr/>
+          </p:nvCxnSpPr>
+          <p:spPr>
+            <a:xfrm>
+              <a:off x="1115645" y="1819075"/>
+              <a:ext cx="0" cy="2762936"/>
+            </a:xfrm>
+            <a:prstGeom prst="line">
+              <a:avLst/>
+            </a:prstGeom>
+            <a:ln>
+              <a:solidFill>
+                <a:schemeClr val="tx1"/>
+              </a:solidFill>
+            </a:ln>
+            <a:effectLst/>
+          </p:spPr>
+          <p:style>
+            <a:lnRef idx="2">
+              <a:schemeClr val="accent1"/>
+            </a:lnRef>
+            <a:fillRef idx="0">
+              <a:schemeClr val="accent1"/>
+            </a:fillRef>
+            <a:effectRef idx="1">
+              <a:schemeClr val="accent1"/>
+            </a:effectRef>
+            <a:fontRef idx="minor">
+              <a:schemeClr val="tx1"/>
+            </a:fontRef>
+          </p:style>
+        </p:cxnSp>
+        <p:cxnSp>
+          <p:nvCxnSpPr>
+            <p:cNvPr id="79" name="Straight Connector 78"/>
+            <p:cNvCxnSpPr/>
+            <p:nvPr/>
+          </p:nvCxnSpPr>
+          <p:spPr>
+            <a:xfrm>
+              <a:off x="2435182" y="941810"/>
+              <a:ext cx="0" cy="2762936"/>
+            </a:xfrm>
+            <a:prstGeom prst="line">
+              <a:avLst/>
+            </a:prstGeom>
+            <a:ln>
+              <a:solidFill>
+                <a:schemeClr val="tx1"/>
+              </a:solidFill>
+            </a:ln>
+            <a:effectLst/>
+          </p:spPr>
+          <p:style>
+            <a:lnRef idx="2">
+              <a:schemeClr val="accent1"/>
+            </a:lnRef>
+            <a:fillRef idx="0">
+              <a:schemeClr val="accent1"/>
+            </a:fillRef>
+            <a:effectRef idx="1">
+              <a:schemeClr val="accent1"/>
+            </a:effectRef>
+            <a:fontRef idx="minor">
+              <a:schemeClr val="tx1"/>
+            </a:fontRef>
+          </p:style>
+        </p:cxnSp>
+        <p:cxnSp>
+          <p:nvCxnSpPr>
+            <p:cNvPr id="80" name="Straight Connector 79"/>
+            <p:cNvCxnSpPr/>
+            <p:nvPr/>
+          </p:nvCxnSpPr>
+          <p:spPr>
+            <a:xfrm flipV="1">
+              <a:off x="1115645" y="941810"/>
+              <a:ext cx="1319537" cy="877265"/>
+            </a:xfrm>
+            <a:prstGeom prst="line">
+              <a:avLst/>
+            </a:prstGeom>
+            <a:ln>
+              <a:solidFill>
+                <a:schemeClr val="tx1"/>
+              </a:solidFill>
+            </a:ln>
+            <a:effectLst/>
+          </p:spPr>
+          <p:style>
+            <a:lnRef idx="2">
+              <a:schemeClr val="accent1"/>
+            </a:lnRef>
+            <a:fillRef idx="0">
+              <a:schemeClr val="accent1"/>
+            </a:fillRef>
+            <a:effectRef idx="1">
+              <a:schemeClr val="accent1"/>
+            </a:effectRef>
+            <a:fontRef idx="minor">
+              <a:schemeClr val="tx1"/>
+            </a:fontRef>
+          </p:style>
+        </p:cxnSp>
+        <p:cxnSp>
+          <p:nvCxnSpPr>
+            <p:cNvPr id="81" name="Straight Connector 80"/>
+            <p:cNvCxnSpPr/>
+            <p:nvPr/>
+          </p:nvCxnSpPr>
+          <p:spPr>
+            <a:xfrm flipV="1">
+              <a:off x="1115645" y="3704746"/>
+              <a:ext cx="1319537" cy="877265"/>
+            </a:xfrm>
+            <a:prstGeom prst="line">
+              <a:avLst/>
+            </a:prstGeom>
+            <a:ln>
+              <a:solidFill>
+                <a:schemeClr val="tx1"/>
+              </a:solidFill>
+            </a:ln>
+            <a:effectLst/>
+          </p:spPr>
+          <p:style>
+            <a:lnRef idx="2">
+              <a:schemeClr val="accent1"/>
+            </a:lnRef>
+            <a:fillRef idx="0">
+              <a:schemeClr val="accent1"/>
+            </a:fillRef>
+            <a:effectRef idx="1">
+              <a:schemeClr val="accent1"/>
+            </a:effectRef>
+            <a:fontRef idx="minor">
+              <a:schemeClr val="tx1"/>
+            </a:fontRef>
+          </p:style>
+        </p:cxnSp>
+      </p:grpSp>
+      <p:grpSp>
+        <p:nvGrpSpPr>
+          <p:cNvPr id="54" name="Group 53"/>
+          <p:cNvGrpSpPr/>
+          <p:nvPr/>
+        </p:nvGrpSpPr>
+        <p:grpSpPr>
+          <a:xfrm>
+            <a:off x="6601565" y="1481547"/>
+            <a:ext cx="1275288" cy="3394833"/>
+            <a:chOff x="1115645" y="941810"/>
+            <a:chExt cx="1319537" cy="3640201"/>
+          </a:xfrm>
+        </p:grpSpPr>
+        <p:cxnSp>
+          <p:nvCxnSpPr>
+            <p:cNvPr id="74" name="Straight Connector 73"/>
+            <p:cNvCxnSpPr/>
+            <p:nvPr/>
+          </p:nvCxnSpPr>
+          <p:spPr>
+            <a:xfrm>
+              <a:off x="1115645" y="1819075"/>
+              <a:ext cx="0" cy="2762936"/>
+            </a:xfrm>
+            <a:prstGeom prst="line">
+              <a:avLst/>
+            </a:prstGeom>
+            <a:ln>
+              <a:solidFill>
+                <a:schemeClr val="tx1"/>
+              </a:solidFill>
+            </a:ln>
+            <a:effectLst/>
+          </p:spPr>
+          <p:style>
+            <a:lnRef idx="2">
+              <a:schemeClr val="accent1"/>
+            </a:lnRef>
+            <a:fillRef idx="0">
+              <a:schemeClr val="accent1"/>
+            </a:fillRef>
+            <a:effectRef idx="1">
+              <a:schemeClr val="accent1"/>
+            </a:effectRef>
+            <a:fontRef idx="minor">
+              <a:schemeClr val="tx1"/>
+            </a:fontRef>
+          </p:style>
+        </p:cxnSp>
+        <p:cxnSp>
+          <p:nvCxnSpPr>
+            <p:cNvPr id="75" name="Straight Connector 74"/>
+            <p:cNvCxnSpPr/>
+            <p:nvPr/>
+          </p:nvCxnSpPr>
+          <p:spPr>
+            <a:xfrm>
+              <a:off x="2435182" y="941810"/>
+              <a:ext cx="0" cy="2762936"/>
+            </a:xfrm>
+            <a:prstGeom prst="line">
+              <a:avLst/>
+            </a:prstGeom>
+            <a:ln>
+              <a:solidFill>
+                <a:schemeClr val="tx1"/>
+              </a:solidFill>
+            </a:ln>
+            <a:effectLst/>
+          </p:spPr>
+          <p:style>
+            <a:lnRef idx="2">
+              <a:schemeClr val="accent1"/>
+            </a:lnRef>
+            <a:fillRef idx="0">
+              <a:schemeClr val="accent1"/>
+            </a:fillRef>
+            <a:effectRef idx="1">
+              <a:schemeClr val="accent1"/>
+            </a:effectRef>
+            <a:fontRef idx="minor">
+              <a:schemeClr val="tx1"/>
+            </a:fontRef>
+          </p:style>
+        </p:cxnSp>
+        <p:cxnSp>
+          <p:nvCxnSpPr>
+            <p:cNvPr id="76" name="Straight Connector 75"/>
+            <p:cNvCxnSpPr/>
+            <p:nvPr/>
+          </p:nvCxnSpPr>
+          <p:spPr>
+            <a:xfrm flipV="1">
+              <a:off x="1115645" y="941810"/>
+              <a:ext cx="1319537" cy="877265"/>
+            </a:xfrm>
+            <a:prstGeom prst="line">
+              <a:avLst/>
+            </a:prstGeom>
+            <a:ln>
+              <a:solidFill>
+                <a:schemeClr val="tx1"/>
+              </a:solidFill>
+            </a:ln>
+            <a:effectLst/>
+          </p:spPr>
+          <p:style>
+            <a:lnRef idx="2">
+              <a:schemeClr val="accent1"/>
+            </a:lnRef>
+            <a:fillRef idx="0">
+              <a:schemeClr val="accent1"/>
+            </a:fillRef>
+            <a:effectRef idx="1">
+              <a:schemeClr val="accent1"/>
+            </a:effectRef>
+            <a:fontRef idx="minor">
+              <a:schemeClr val="tx1"/>
+            </a:fontRef>
+          </p:style>
+        </p:cxnSp>
+        <p:cxnSp>
+          <p:nvCxnSpPr>
+            <p:cNvPr id="77" name="Straight Connector 76"/>
+            <p:cNvCxnSpPr/>
+            <p:nvPr/>
+          </p:nvCxnSpPr>
+          <p:spPr>
+            <a:xfrm flipV="1">
+              <a:off x="1115645" y="3704746"/>
+              <a:ext cx="1319537" cy="877265"/>
+            </a:xfrm>
+            <a:prstGeom prst="line">
+              <a:avLst/>
+            </a:prstGeom>
+            <a:ln>
+              <a:solidFill>
+                <a:schemeClr val="tx1"/>
+              </a:solidFill>
+            </a:ln>
+            <a:effectLst/>
+          </p:spPr>
+          <p:style>
+            <a:lnRef idx="2">
+              <a:schemeClr val="accent1"/>
+            </a:lnRef>
+            <a:fillRef idx="0">
+              <a:schemeClr val="accent1"/>
+            </a:fillRef>
+            <a:effectRef idx="1">
+              <a:schemeClr val="accent1"/>
+            </a:effectRef>
+            <a:fontRef idx="minor">
+              <a:schemeClr val="tx1"/>
+            </a:fontRef>
+          </p:style>
+        </p:cxnSp>
+      </p:grpSp>
+      <p:sp>
+        <p:nvSpPr>
+          <p:cNvPr id="55" name="Oval 54"/>
+          <p:cNvSpPr>
+            <a:spLocks noChangeAspect="1"/>
+          </p:cNvSpPr>
+          <p:nvPr/>
+        </p:nvSpPr>
+        <p:spPr>
+          <a:xfrm>
+            <a:off x="4062561" y="3077285"/>
+            <a:ext cx="189728" cy="359999"/>
+          </a:xfrm>
+          <a:prstGeom prst="ellipse">
+            <a:avLst/>
+          </a:prstGeom>
+          <a:solidFill>
+            <a:schemeClr val="tx1"/>
+          </a:solidFill>
+          <a:ln>
+            <a:solidFill>
+              <a:srgbClr val="000000"/>
+            </a:solidFill>
+          </a:ln>
+          <a:effectLst/>
+        </p:spPr>
+        <p:style>
+          <a:lnRef idx="1">
+            <a:schemeClr val="accent1"/>
+          </a:lnRef>
+          <a:fillRef idx="3">
+            <a:schemeClr val="accent1"/>
+          </a:fillRef>
+          <a:effectRef idx="2">
+            <a:schemeClr val="accent1"/>
+          </a:effectRef>
+          <a:fontRef idx="minor">
+            <a:schemeClr val="lt1"/>
+          </a:fontRef>
+        </p:style>
+        <p:txBody>
+          <a:bodyPr rtlCol="0" anchor="ctr"/>
+          <a:lstStyle/>
+          <a:p>
+            <a:pPr algn="ctr"/>
+            <a:endParaRPr lang="en-US"/>
+          </a:p>
+        </p:txBody>
+      </p:sp>
+      <p:cxnSp>
+        <p:nvCxnSpPr>
+          <p:cNvPr id="56" name="Straight Connector 55"/>
+          <p:cNvCxnSpPr>
+            <a:endCxn id="58" idx="0"/>
+          </p:cNvCxnSpPr>
+          <p:nvPr/>
+        </p:nvCxnSpPr>
+        <p:spPr>
+          <a:xfrm flipV="1">
+            <a:off x="1138757" y="2816096"/>
+            <a:ext cx="6137640" cy="492314"/>
+          </a:xfrm>
+          <a:prstGeom prst="line">
+            <a:avLst/>
+          </a:prstGeom>
+          <a:ln>
+            <a:solidFill>
+              <a:srgbClr val="000000"/>
+            </a:solidFill>
+            <a:prstDash val="dash"/>
+            <a:headEnd type="none"/>
+            <a:tailEnd type="arrow"/>
+          </a:ln>
+          <a:effectLst/>
+        </p:spPr>
+        <p:style>
+          <a:lnRef idx="2">
+            <a:schemeClr val="accent1"/>
+          </a:lnRef>
+          <a:fillRef idx="0">
+            <a:schemeClr val="accent1"/>
+          </a:fillRef>
+          <a:effectRef idx="1">
+            <a:schemeClr val="accent1"/>
+          </a:effectRef>
+          <a:fontRef idx="minor">
+            <a:schemeClr val="tx1"/>
+          </a:fontRef>
+        </p:style>
+      </p:cxnSp>
+      <p:cxnSp>
+        <p:nvCxnSpPr>
+          <p:cNvPr id="57" name="Straight Connector 56"/>
+          <p:cNvCxnSpPr>
+            <a:endCxn id="58" idx="4"/>
+          </p:cNvCxnSpPr>
+          <p:nvPr/>
+        </p:nvCxnSpPr>
+        <p:spPr>
+          <a:xfrm>
+            <a:off x="1138757" y="3308409"/>
+            <a:ext cx="6137640" cy="227686"/>
+          </a:xfrm>
+          <a:prstGeom prst="line">
+            <a:avLst/>
+          </a:prstGeom>
+          <a:ln>
+            <a:solidFill>
+              <a:srgbClr val="000000"/>
+            </a:solidFill>
+            <a:prstDash val="dash"/>
+            <a:headEnd type="none"/>
+            <a:tailEnd type="arrow"/>
+          </a:ln>
+          <a:effectLst/>
+        </p:spPr>
+        <p:style>
+          <a:lnRef idx="2">
+            <a:schemeClr val="accent1"/>
+          </a:lnRef>
+          <a:fillRef idx="0">
+            <a:schemeClr val="accent1"/>
+          </a:fillRef>
+          <a:effectRef idx="1">
+            <a:schemeClr val="accent1"/>
+          </a:effectRef>
+          <a:fontRef idx="minor">
+            <a:schemeClr val="tx1"/>
+          </a:fontRef>
+        </p:style>
+      </p:cxnSp>
+      <p:sp>
+        <p:nvSpPr>
+          <p:cNvPr id="58" name="Oval 57"/>
+          <p:cNvSpPr>
+            <a:spLocks noChangeAspect="1"/>
+          </p:cNvSpPr>
+          <p:nvPr/>
+        </p:nvSpPr>
+        <p:spPr>
+          <a:xfrm>
+            <a:off x="7086667" y="2816096"/>
+            <a:ext cx="379457" cy="720000"/>
+          </a:xfrm>
+          <a:prstGeom prst="ellipse">
+            <a:avLst/>
+          </a:prstGeom>
+          <a:solidFill>
+            <a:srgbClr val="FFFFFF"/>
+          </a:solidFill>
+          <a:ln w="28575" cmpd="sng">
+            <a:solidFill>
+              <a:srgbClr val="000000"/>
+            </a:solidFill>
+            <a:prstDash val="dash"/>
+          </a:ln>
+          <a:effectLst/>
+        </p:spPr>
+        <p:style>
+          <a:lnRef idx="1">
+            <a:schemeClr val="accent1"/>
+          </a:lnRef>
+          <a:fillRef idx="3">
+            <a:schemeClr val="accent1"/>
+          </a:fillRef>
+          <a:effectRef idx="2">
+            <a:schemeClr val="accent1"/>
+          </a:effectRef>
+          <a:fontRef idx="minor">
+            <a:schemeClr val="lt1"/>
+          </a:fontRef>
+        </p:style>
+        <p:txBody>
+          <a:bodyPr rtlCol="0" anchor="ctr"/>
+          <a:lstStyle/>
+          <a:p>
+            <a:pPr algn="ctr"/>
+            <a:endParaRPr lang="en-US"/>
+          </a:p>
+        </p:txBody>
+      </p:sp>
+      <p:sp>
+        <p:nvSpPr>
+          <p:cNvPr id="59" name="TextBox 58"/>
+          <p:cNvSpPr txBox="1"/>
+          <p:nvPr/>
+        </p:nvSpPr>
+        <p:spPr>
+          <a:xfrm>
+            <a:off x="3359230" y="-42807"/>
+            <a:ext cx="1450807" cy="923330"/>
+          </a:xfrm>
+          <a:prstGeom prst="rect">
+            <a:avLst/>
+          </a:prstGeom>
+          <a:noFill/>
+        </p:spPr>
+        <p:txBody>
+          <a:bodyPr wrap="none" rtlCol="0" anchor="b">
+            <a:spAutoFit/>
+          </a:bodyPr>
+          <a:lstStyle/>
+          <a:p>
+            <a:pPr algn="ctr"/>
+            <a:r>
+              <a:rPr lang="en-US" sz="2700" dirty="0"/>
+              <a:t>Finite </a:t>
+            </a:r>
+          </a:p>
+          <a:p>
+            <a:pPr algn="ctr"/>
+            <a:r>
+              <a:rPr lang="en-US" sz="2700" dirty="0"/>
+              <a:t>Aperture</a:t>
+            </a:r>
+          </a:p>
+        </p:txBody>
+      </p:sp>
+      <p:sp>
+        <p:nvSpPr>
+          <p:cNvPr id="72" name="TextBox 71"/>
+          <p:cNvSpPr txBox="1"/>
+          <p:nvPr/>
+        </p:nvSpPr>
+        <p:spPr>
+          <a:xfrm>
+            <a:off x="487976" y="164942"/>
+            <a:ext cx="1147670" cy="507831"/>
+          </a:xfrm>
+          <a:prstGeom prst="rect">
+            <a:avLst/>
+          </a:prstGeom>
+          <a:noFill/>
+        </p:spPr>
+        <p:txBody>
+          <a:bodyPr wrap="none" rtlCol="0">
+            <a:spAutoFit/>
+          </a:bodyPr>
+          <a:lstStyle/>
+          <a:p>
+            <a:pPr algn="ctr"/>
+            <a:r>
+              <a:rPr lang="en-US" sz="2700" dirty="0"/>
+              <a:t>Source</a:t>
+            </a:r>
+            <a:endParaRPr lang="en-US" sz="2700" dirty="0"/>
+          </a:p>
+        </p:txBody>
+      </p:sp>
+      <p:sp>
+        <p:nvSpPr>
+          <p:cNvPr id="70" name="TextBox 69"/>
+          <p:cNvSpPr txBox="1"/>
+          <p:nvPr/>
+        </p:nvSpPr>
+        <p:spPr>
+          <a:xfrm>
+            <a:off x="6505408" y="-46825"/>
+            <a:ext cx="1538552" cy="923330"/>
+          </a:xfrm>
+          <a:prstGeom prst="rect">
+            <a:avLst/>
+          </a:prstGeom>
+          <a:noFill/>
+        </p:spPr>
+        <p:txBody>
+          <a:bodyPr wrap="none" rtlCol="0" anchor="b">
+            <a:spAutoFit/>
+          </a:bodyPr>
+          <a:lstStyle/>
+          <a:p>
+            <a:pPr algn="ctr"/>
+            <a:r>
+              <a:rPr lang="en-US" sz="2700" dirty="0"/>
+              <a:t>Projected</a:t>
+            </a:r>
+          </a:p>
+          <a:p>
+            <a:pPr algn="ctr"/>
+            <a:r>
+              <a:rPr lang="en-US" sz="2700" dirty="0"/>
+              <a:t>Image</a:t>
+            </a:r>
+          </a:p>
+        </p:txBody>
+      </p:sp>
+      <p:cxnSp>
+        <p:nvCxnSpPr>
+          <p:cNvPr id="62" name="Straight Arrow Connector 61"/>
+          <p:cNvCxnSpPr/>
+          <p:nvPr/>
+        </p:nvCxnSpPr>
+        <p:spPr>
+          <a:xfrm>
+            <a:off x="1279976" y="1884142"/>
+            <a:ext cx="2782585" cy="0"/>
+          </a:xfrm>
+          <a:prstGeom prst="straightConnector1">
+            <a:avLst/>
+          </a:prstGeom>
+          <a:ln>
+            <a:solidFill>
+              <a:srgbClr val="000000"/>
+            </a:solidFill>
+            <a:headEnd type="arrow"/>
+            <a:tailEnd type="arrow"/>
+          </a:ln>
+          <a:effectLst/>
+        </p:spPr>
+        <p:style>
+          <a:lnRef idx="2">
+            <a:schemeClr val="accent1"/>
+          </a:lnRef>
+          <a:fillRef idx="0">
+            <a:schemeClr val="accent1"/>
+          </a:fillRef>
+          <a:effectRef idx="1">
+            <a:schemeClr val="accent1"/>
+          </a:effectRef>
+          <a:fontRef idx="minor">
+            <a:schemeClr val="tx1"/>
+          </a:fontRef>
+        </p:style>
+      </p:cxnSp>
+      <p:sp>
+        <p:nvSpPr>
+          <p:cNvPr id="63" name="TextBox 62"/>
+          <p:cNvSpPr txBox="1"/>
+          <p:nvPr/>
+        </p:nvSpPr>
+        <p:spPr>
+          <a:xfrm>
+            <a:off x="2488214" y="1480629"/>
+            <a:ext cx="406081" cy="400110"/>
+          </a:xfrm>
+          <a:prstGeom prst="rect">
+            <a:avLst/>
+          </a:prstGeom>
+          <a:noFill/>
+        </p:spPr>
+        <p:txBody>
+          <a:bodyPr wrap="none" rtlCol="0">
+            <a:spAutoFit/>
+          </a:bodyPr>
+          <a:lstStyle/>
+          <a:p>
+            <a:r>
+              <a:rPr lang="en-US" sz="2000" dirty="0"/>
+              <a:t>d</a:t>
+            </a:r>
+            <a:r>
+              <a:rPr lang="en-US" sz="2000" baseline="-25000" dirty="0"/>
+              <a:t>1</a:t>
+            </a:r>
+            <a:endParaRPr lang="en-US" sz="2000" baseline="-25000" dirty="0"/>
+          </a:p>
+        </p:txBody>
+      </p:sp>
+      <p:cxnSp>
+        <p:nvCxnSpPr>
+          <p:cNvPr id="64" name="Straight Arrow Connector 63"/>
+          <p:cNvCxnSpPr/>
+          <p:nvPr/>
+        </p:nvCxnSpPr>
+        <p:spPr>
+          <a:xfrm>
+            <a:off x="4368275" y="1880739"/>
+            <a:ext cx="2718392" cy="0"/>
+          </a:xfrm>
+          <a:prstGeom prst="straightConnector1">
+            <a:avLst/>
+          </a:prstGeom>
+          <a:ln>
+            <a:solidFill>
+              <a:srgbClr val="000000"/>
+            </a:solidFill>
+            <a:headEnd type="arrow"/>
+            <a:tailEnd type="arrow"/>
+          </a:ln>
+          <a:effectLst/>
+        </p:spPr>
+        <p:style>
+          <a:lnRef idx="2">
+            <a:schemeClr val="accent1"/>
+          </a:lnRef>
+          <a:fillRef idx="0">
+            <a:schemeClr val="accent1"/>
+          </a:fillRef>
+          <a:effectRef idx="1">
+            <a:schemeClr val="accent1"/>
+          </a:effectRef>
+          <a:fontRef idx="minor">
+            <a:schemeClr val="tx1"/>
+          </a:fontRef>
+        </p:style>
+      </p:cxnSp>
+      <p:sp>
+        <p:nvSpPr>
+          <p:cNvPr id="65" name="TextBox 64"/>
+          <p:cNvSpPr txBox="1"/>
+          <p:nvPr/>
+        </p:nvSpPr>
+        <p:spPr>
+          <a:xfrm>
+            <a:off x="5601746" y="1477226"/>
+            <a:ext cx="406081" cy="400110"/>
+          </a:xfrm>
+          <a:prstGeom prst="rect">
+            <a:avLst/>
+          </a:prstGeom>
+          <a:noFill/>
+        </p:spPr>
+        <p:txBody>
+          <a:bodyPr wrap="none" rtlCol="0">
+            <a:spAutoFit/>
+          </a:bodyPr>
+          <a:lstStyle/>
+          <a:p>
+            <a:r>
+              <a:rPr lang="en-US" sz="2000" dirty="0"/>
+              <a:t>d</a:t>
+            </a:r>
+            <a:r>
+              <a:rPr lang="en-US" sz="2000" baseline="-25000" dirty="0"/>
+              <a:t>2</a:t>
+            </a:r>
+            <a:endParaRPr lang="en-US" sz="2000" baseline="-25000" dirty="0"/>
+          </a:p>
+        </p:txBody>
+      </p:sp>
+      <p:sp>
+        <p:nvSpPr>
+          <p:cNvPr id="66" name="Right Brace 65"/>
+          <p:cNvSpPr/>
+          <p:nvPr/>
+        </p:nvSpPr>
+        <p:spPr>
+          <a:xfrm rot="16200000">
+            <a:off x="4103543" y="2636096"/>
+            <a:ext cx="169465" cy="359999"/>
+          </a:xfrm>
+          <a:prstGeom prst="rightBrace">
+            <a:avLst/>
+          </a:prstGeom>
+          <a:ln>
+            <a:solidFill>
+              <a:srgbClr val="000000"/>
+            </a:solidFill>
+          </a:ln>
+          <a:effectLst/>
+        </p:spPr>
+        <p:style>
+          <a:lnRef idx="2">
+            <a:schemeClr val="accent1"/>
+          </a:lnRef>
+          <a:fillRef idx="0">
+            <a:schemeClr val="accent1"/>
+          </a:fillRef>
+          <a:effectRef idx="1">
+            <a:schemeClr val="accent1"/>
+          </a:effectRef>
+          <a:fontRef idx="minor">
+            <a:schemeClr val="tx1"/>
+          </a:fontRef>
+        </p:style>
+        <p:txBody>
+          <a:bodyPr rtlCol="0" anchor="ctr"/>
+          <a:lstStyle/>
+          <a:p>
+            <a:pPr algn="ctr"/>
+            <a:endParaRPr lang="en-US"/>
+          </a:p>
+        </p:txBody>
+      </p:sp>
+      <p:sp>
+        <p:nvSpPr>
+          <p:cNvPr id="67" name="TextBox 66"/>
+          <p:cNvSpPr txBox="1"/>
+          <p:nvPr/>
+        </p:nvSpPr>
+        <p:spPr>
+          <a:xfrm>
+            <a:off x="4000258" y="2329287"/>
+            <a:ext cx="404077" cy="400110"/>
+          </a:xfrm>
+          <a:prstGeom prst="rect">
+            <a:avLst/>
+          </a:prstGeom>
+          <a:noFill/>
+        </p:spPr>
+        <p:txBody>
+          <a:bodyPr wrap="none" rtlCol="0">
+            <a:spAutoFit/>
+          </a:bodyPr>
+          <a:lstStyle/>
+          <a:p>
+            <a:r>
+              <a:rPr lang="en-US" sz="2000" dirty="0"/>
+              <a:t>2r</a:t>
+            </a:r>
+            <a:endParaRPr lang="en-US" sz="2000" baseline="-25000" dirty="0"/>
+          </a:p>
+        </p:txBody>
+      </p:sp>
+      <p:sp>
+        <p:nvSpPr>
+          <p:cNvPr id="68" name="Right Brace 67"/>
+          <p:cNvSpPr/>
+          <p:nvPr/>
+        </p:nvSpPr>
+        <p:spPr>
+          <a:xfrm rot="16200000">
+            <a:off x="7189952" y="2436041"/>
+            <a:ext cx="169465" cy="359999"/>
+          </a:xfrm>
+          <a:prstGeom prst="rightBrace">
+            <a:avLst/>
+          </a:prstGeom>
+          <a:ln>
+            <a:solidFill>
+              <a:srgbClr val="000000"/>
+            </a:solidFill>
+          </a:ln>
+          <a:effectLst/>
+        </p:spPr>
+        <p:style>
+          <a:lnRef idx="2">
+            <a:schemeClr val="accent1"/>
+          </a:lnRef>
+          <a:fillRef idx="0">
+            <a:schemeClr val="accent1"/>
+          </a:fillRef>
+          <a:effectRef idx="1">
+            <a:schemeClr val="accent1"/>
+          </a:effectRef>
+          <a:fontRef idx="minor">
+            <a:schemeClr val="tx1"/>
+          </a:fontRef>
+        </p:style>
+        <p:txBody>
+          <a:bodyPr rtlCol="0" anchor="ctr"/>
+          <a:lstStyle/>
+          <a:p>
+            <a:pPr algn="ctr"/>
+            <a:endParaRPr lang="en-US"/>
+          </a:p>
+        </p:txBody>
+      </p:sp>
+      <p:sp>
+        <p:nvSpPr>
+          <p:cNvPr id="69" name="TextBox 68"/>
+          <p:cNvSpPr txBox="1"/>
+          <p:nvPr/>
+        </p:nvSpPr>
+        <p:spPr>
+          <a:xfrm>
+            <a:off x="7059929" y="2129232"/>
+            <a:ext cx="453970" cy="400110"/>
+          </a:xfrm>
+          <a:prstGeom prst="rect">
+            <a:avLst/>
+          </a:prstGeom>
+          <a:noFill/>
+        </p:spPr>
+        <p:txBody>
+          <a:bodyPr wrap="none" rtlCol="0">
+            <a:spAutoFit/>
+          </a:bodyPr>
+          <a:lstStyle/>
+          <a:p>
+            <a:r>
+              <a:rPr lang="en-US" sz="2000" dirty="0"/>
+              <a:t>2R</a:t>
+            </a:r>
+            <a:endParaRPr lang="en-US" sz="2000" baseline="-25000" dirty="0"/>
+          </a:p>
+        </p:txBody>
+      </p:sp>
+      <p:pic>
+        <p:nvPicPr>
+          <p:cNvPr id="51" name="Picture 50" descr="latex-image-1.pdf"/>
+          <p:cNvPicPr>
+            <a:picLocks noChangeAspect="1"/>
+          </p:cNvPicPr>
+          <p:nvPr/>
+        </p:nvPicPr>
+        <p:blipFill>
+          <a:blip r:embed="rId2">
+            <a:extLst>
+              <a:ext uri="{28A0092B-C50C-407E-A947-70E740481C1C}">
+                <a14:useLocalDpi xmlns:a14="http://schemas.microsoft.com/office/drawing/2010/main" val="0"/>
+              </a:ext>
+            </a:extLst>
+          </a:blip>
+          <a:stretch>
+            <a:fillRect/>
+          </a:stretch>
+        </p:blipFill>
+        <p:spPr>
+          <a:xfrm>
+            <a:off x="4062561" y="4876380"/>
+            <a:ext cx="2381653" cy="810775"/>
+          </a:xfrm>
+          <a:prstGeom prst="rect">
+            <a:avLst/>
+          </a:prstGeom>
+        </p:spPr>
+      </p:pic>
+      <p:pic>
+        <p:nvPicPr>
+          <p:cNvPr id="3" name="Picture 2"/>
+          <p:cNvPicPr>
+            <a:picLocks noChangeAspect="1"/>
+          </p:cNvPicPr>
+          <p:nvPr/>
+        </p:nvPicPr>
+        <p:blipFill rotWithShape="1">
+          <a:blip r:embed="rId3"/>
+          <a:srcRect l="59522" t="-3732"/>
+          <a:stretch/>
+        </p:blipFill>
+        <p:spPr>
+          <a:xfrm>
+            <a:off x="487976" y="879175"/>
+            <a:ext cx="1126385" cy="410778"/>
+          </a:xfrm>
+          <a:prstGeom prst="rect">
+            <a:avLst/>
+          </a:prstGeom>
+        </p:spPr>
+      </p:pic>
+      <p:pic>
+        <p:nvPicPr>
+          <p:cNvPr id="5" name="Picture 4"/>
+          <p:cNvPicPr>
+            <a:picLocks noChangeAspect="1"/>
+          </p:cNvPicPr>
+          <p:nvPr/>
+        </p:nvPicPr>
+        <p:blipFill>
+          <a:blip r:embed="rId4"/>
+          <a:stretch>
+            <a:fillRect/>
+          </a:stretch>
+        </p:blipFill>
+        <p:spPr>
+          <a:xfrm>
+            <a:off x="6748165" y="887975"/>
+            <a:ext cx="1059568" cy="396000"/>
+          </a:xfrm>
+          <a:prstGeom prst="rect">
+            <a:avLst/>
+          </a:prstGeom>
+        </p:spPr>
+      </p:pic>
     </p:spTree>
     <p:extLst>
       <p:ext uri="{BB962C8B-B14F-4D97-AF65-F5344CB8AC3E}">

</xml_diff>